<commit_message>
add files from today
</commit_message>
<xml_diff>
--- a/13_designing_an_experiment (part1)/13-ControlStudyMemorisation-50minPart1.pptx
+++ b/13_designing_an_experiment (part1)/13-ControlStudyMemorisation-50minPart1.pptx
@@ -378,14 +378,14 @@
           </a:ln>
           <a:extLst>
             <a:ext uri="{909E8E84-426E-40dd-AFC4-6F175D3DCCD1}">
-              <a14:hiddenFill xmlns:a14="http://schemas.microsoft.com/office/drawing/2010/main" xmlns="">
+              <a14:hiddenFill xmlns="" xmlns:a14="http://schemas.microsoft.com/office/drawing/2010/main">
                 <a:solidFill>
                   <a:srgbClr val="FFFFFF"/>
                 </a:solidFill>
               </a14:hiddenFill>
             </a:ext>
             <a:ext uri="{FAA26D3D-D897-4be2-8F04-BA451C77F1D7}">
-              <ma14:placeholderFlag xmlns:ma14="http://schemas.microsoft.com/office/mac/drawingml/2011/main" xmlns="" val="1"/>
+              <ma14:placeholderFlag xmlns="" xmlns:ma14="http://schemas.microsoft.com/office/mac/drawingml/2011/main" val="1"/>
             </a:ext>
           </a:extLst>
         </p:spPr>
@@ -1554,6 +1554,121 @@
             <a:endParaRPr lang="en-US" b="0" dirty="0"/>
           </a:p>
           <a:p>
+            <a:r>
+              <a:rPr lang="en-US" b="0" dirty="0">
+                <a:latin typeface="Courier" pitchFamily="2" charset="0"/>
+                <a:cs typeface="Arial" pitchFamily="-112" charset="0"/>
+              </a:rPr>
+              <a:t>library(ggplot2) </a:t>
+            </a:r>
+          </a:p>
+          <a:p>
+            <a:pPr marL="0" marR="0" lvl="0" indent="0" algn="l" defTabSz="914400" rtl="0" eaLnBrk="0" fontAlgn="base" latinLnBrk="0" hangingPunct="0">
+              <a:lnSpc>
+                <a:spcPct val="100000"/>
+              </a:lnSpc>
+              <a:spcBef>
+                <a:spcPct val="30000"/>
+              </a:spcBef>
+              <a:spcAft>
+                <a:spcPct val="0"/>
+              </a:spcAft>
+              <a:buClrTx/>
+              <a:buSzTx/>
+              <a:buFontTx/>
+              <a:buNone/>
+              <a:tabLst/>
+              <a:defRPr/>
+            </a:pPr>
+            <a:r>
+              <a:rPr lang="en-US" b="0" dirty="0" err="1">
+                <a:latin typeface="Courier" pitchFamily="2" charset="0"/>
+                <a:cs typeface="Arial" pitchFamily="-112" charset="0"/>
+              </a:rPr>
+              <a:t>ggplot</a:t>
+            </a:r>
+            <a:r>
+              <a:rPr lang="en-US" b="0" dirty="0">
+                <a:latin typeface="Courier" pitchFamily="2" charset="0"/>
+                <a:cs typeface="Arial" pitchFamily="-112" charset="0"/>
+              </a:rPr>
+              <a:t>(</a:t>
+            </a:r>
+            <a:r>
+              <a:rPr lang="en-US" b="0" dirty="0" err="1">
+                <a:latin typeface="Courier" pitchFamily="2" charset="0"/>
+                <a:cs typeface="Arial" pitchFamily="-112" charset="0"/>
+              </a:rPr>
+              <a:t>dat</a:t>
+            </a:r>
+            <a:r>
+              <a:rPr lang="en-US" b="0" dirty="0">
+                <a:latin typeface="Courier" pitchFamily="2" charset="0"/>
+                <a:cs typeface="Arial" pitchFamily="-112" charset="0"/>
+              </a:rPr>
+              <a:t>, </a:t>
+            </a:r>
+            <a:r>
+              <a:rPr lang="en-US" b="0" dirty="0" err="1">
+                <a:latin typeface="Courier" pitchFamily="2" charset="0"/>
+                <a:cs typeface="Arial" pitchFamily="-112" charset="0"/>
+              </a:rPr>
+              <a:t>aes</a:t>
+            </a:r>
+            <a:r>
+              <a:rPr lang="en-US" b="0" dirty="0">
+                <a:latin typeface="Courier" pitchFamily="2" charset="0"/>
+                <a:cs typeface="Arial" pitchFamily="-112" charset="0"/>
+              </a:rPr>
+              <a:t>(x = </a:t>
+            </a:r>
+            <a:r>
+              <a:rPr lang="en-US" b="0" dirty="0" err="1">
+                <a:latin typeface="Courier" pitchFamily="2" charset="0"/>
+                <a:cs typeface="Arial" pitchFamily="-112" charset="0"/>
+              </a:rPr>
+              <a:t>dat$id</a:t>
+            </a:r>
+            <a:r>
+              <a:rPr lang="en-US" b="0" dirty="0">
+                <a:latin typeface="Courier" pitchFamily="2" charset="0"/>
+                <a:cs typeface="Arial" pitchFamily="-112" charset="0"/>
+              </a:rPr>
+              <a:t>, y = </a:t>
+            </a:r>
+            <a:r>
+              <a:rPr lang="en-US" b="0" dirty="0" err="1">
+                <a:latin typeface="Courier" pitchFamily="2" charset="0"/>
+                <a:cs typeface="Arial" pitchFamily="-112" charset="0"/>
+              </a:rPr>
+              <a:t>dat$score</a:t>
+            </a:r>
+            <a:r>
+              <a:rPr lang="en-US" b="0" dirty="0">
+                <a:latin typeface="Courier" pitchFamily="2" charset="0"/>
+                <a:cs typeface="Arial" pitchFamily="-112" charset="0"/>
+              </a:rPr>
+              <a:t>)) + </a:t>
+            </a:r>
+            <a:r>
+              <a:rPr lang="en-US" b="0" dirty="0" err="1">
+                <a:latin typeface="Courier" pitchFamily="2" charset="0"/>
+                <a:cs typeface="Arial" pitchFamily="-112" charset="0"/>
+              </a:rPr>
+              <a:t>geom_bar</a:t>
+            </a:r>
+            <a:r>
+              <a:rPr lang="en-US" b="0" dirty="0">
+                <a:latin typeface="Courier" pitchFamily="2" charset="0"/>
+                <a:cs typeface="Arial" pitchFamily="-112" charset="0"/>
+              </a:rPr>
+              <a:t>(stat = 'identity', position = 'dodge')</a:t>
+            </a:r>
+          </a:p>
+          <a:p>
+            <a:endParaRPr lang="en-US" b="0" dirty="0"/>
+          </a:p>
+          <a:p>
             <a:endParaRPr lang="en-US" b="0" dirty="0"/>
           </a:p>
         </p:txBody>
@@ -3006,14 +3121,14 @@
           <a:ln/>
           <a:extLst>
             <a:ext uri="{909E8E84-426E-40dd-AFC4-6F175D3DCCD1}">
-              <a14:hiddenFill xmlns:a14="http://schemas.microsoft.com/office/drawing/2010/main" xmlns="">
+              <a14:hiddenFill xmlns="" xmlns:a14="http://schemas.microsoft.com/office/drawing/2010/main">
                 <a:solidFill>
                   <a:srgbClr val="FFFFFF"/>
                 </a:solidFill>
               </a14:hiddenFill>
             </a:ext>
             <a:ext uri="{91240B29-F687-4f45-9708-019B960494DF}">
-              <a14:hiddenLine xmlns:a14="http://schemas.microsoft.com/office/drawing/2010/main" xmlns="" w="9525">
+              <a14:hiddenLine xmlns="" xmlns:a14="http://schemas.microsoft.com/office/drawing/2010/main" w="9525">
                 <a:solidFill>
                   <a:srgbClr val="000000"/>
                 </a:solidFill>
@@ -3023,7 +3138,7 @@
               </a14:hiddenLine>
             </a:ext>
             <a:ext uri="{FAA26D3D-D897-4be2-8F04-BA451C77F1D7}">
-              <ma14:placeholderFlag xmlns:ma14="http://schemas.microsoft.com/office/mac/drawingml/2011/main" xmlns="" val="1"/>
+              <ma14:placeholderFlag xmlns="" xmlns:ma14="http://schemas.microsoft.com/office/mac/drawingml/2011/main" val="1"/>
             </a:ext>
           </a:extLst>
         </p:spPr>
@@ -3737,14 +3852,14 @@
           </a:ln>
           <a:extLst>
             <a:ext uri="{909E8E84-426E-40dd-AFC4-6F175D3DCCD1}">
-              <a14:hiddenFill xmlns:a14="http://schemas.microsoft.com/office/drawing/2010/main" xmlns="">
+              <a14:hiddenFill xmlns="" xmlns:a14="http://schemas.microsoft.com/office/drawing/2010/main">
                 <a:solidFill>
                   <a:srgbClr val="FFFFFF"/>
                 </a:solidFill>
               </a14:hiddenFill>
             </a:ext>
             <a:ext uri="{91240B29-F687-4f45-9708-019B960494DF}">
-              <a14:hiddenLine xmlns:a14="http://schemas.microsoft.com/office/drawing/2010/main" xmlns="" w="9525">
+              <a14:hiddenLine xmlns="" xmlns:a14="http://schemas.microsoft.com/office/drawing/2010/main" w="9525">
                 <a:solidFill>
                   <a:srgbClr val="000000"/>
                 </a:solidFill>
@@ -3754,7 +3869,7 @@
               </a14:hiddenLine>
             </a:ext>
             <a:ext uri="{FAA26D3D-D897-4be2-8F04-BA451C77F1D7}">
-              <ma14:placeholderFlag xmlns:ma14="http://schemas.microsoft.com/office/mac/drawingml/2011/main" xmlns="" val="1"/>
+              <ma14:placeholderFlag xmlns="" xmlns:ma14="http://schemas.microsoft.com/office/mac/drawingml/2011/main" val="1"/>
             </a:ext>
           </a:extLst>
         </p:spPr>
@@ -3798,14 +3913,14 @@
           </a:ln>
           <a:extLst>
             <a:ext uri="{909E8E84-426E-40dd-AFC4-6F175D3DCCD1}">
-              <a14:hiddenFill xmlns:a14="http://schemas.microsoft.com/office/drawing/2010/main" xmlns="">
+              <a14:hiddenFill xmlns="" xmlns:a14="http://schemas.microsoft.com/office/drawing/2010/main">
                 <a:solidFill>
                   <a:srgbClr val="FFFFFF"/>
                 </a:solidFill>
               </a14:hiddenFill>
             </a:ext>
             <a:ext uri="{91240B29-F687-4f45-9708-019B960494DF}">
-              <a14:hiddenLine xmlns:a14="http://schemas.microsoft.com/office/drawing/2010/main" xmlns="" w="9525">
+              <a14:hiddenLine xmlns="" xmlns:a14="http://schemas.microsoft.com/office/drawing/2010/main" w="9525">
                 <a:solidFill>
                   <a:srgbClr val="000000"/>
                 </a:solidFill>
@@ -3815,7 +3930,7 @@
               </a14:hiddenLine>
             </a:ext>
             <a:ext uri="{FAA26D3D-D897-4be2-8F04-BA451C77F1D7}">
-              <ma14:placeholderFlag xmlns:ma14="http://schemas.microsoft.com/office/mac/drawingml/2011/main" xmlns="" val="1"/>
+              <ma14:placeholderFlag xmlns="" xmlns:ma14="http://schemas.microsoft.com/office/mac/drawingml/2011/main" val="1"/>
             </a:ext>
           </a:extLst>
         </p:spPr>
@@ -4370,14 +4485,14 @@
           </a:ln>
           <a:extLst>
             <a:ext uri="{909E8E84-426E-40dd-AFC4-6F175D3DCCD1}">
-              <a14:hiddenFill xmlns:a14="http://schemas.microsoft.com/office/drawing/2010/main" xmlns="">
+              <a14:hiddenFill xmlns="" xmlns:a14="http://schemas.microsoft.com/office/drawing/2010/main">
                 <a:solidFill>
                   <a:srgbClr val="FFFFFF"/>
                 </a:solidFill>
               </a14:hiddenFill>
             </a:ext>
             <a:ext uri="{91240B29-F687-4f45-9708-019B960494DF}">
-              <a14:hiddenLine xmlns:a14="http://schemas.microsoft.com/office/drawing/2010/main" xmlns="" w="9525">
+              <a14:hiddenLine xmlns="" xmlns:a14="http://schemas.microsoft.com/office/drawing/2010/main" w="9525">
                 <a:solidFill>
                   <a:srgbClr val="000000"/>
                 </a:solidFill>
@@ -4543,14 +4658,14 @@
           </a:ln>
           <a:extLst>
             <a:ext uri="{909E8E84-426E-40dd-AFC4-6F175D3DCCD1}">
-              <a14:hiddenFill xmlns:a14="http://schemas.microsoft.com/office/drawing/2010/main" xmlns="">
+              <a14:hiddenFill xmlns="" xmlns:a14="http://schemas.microsoft.com/office/drawing/2010/main">
                 <a:solidFill>
                   <a:srgbClr val="FFFFFF"/>
                 </a:solidFill>
               </a14:hiddenFill>
             </a:ext>
             <a:ext uri="{91240B29-F687-4f45-9708-019B960494DF}">
-              <a14:hiddenLine xmlns:a14="http://schemas.microsoft.com/office/drawing/2010/main" xmlns="" w="12700">
+              <a14:hiddenLine xmlns="" xmlns:a14="http://schemas.microsoft.com/office/drawing/2010/main" w="12700">
                 <a:solidFill>
                   <a:schemeClr val="tx1"/>
                 </a:solidFill>
@@ -4690,7 +4805,7 @@
           </a:ln>
           <a:extLst>
             <a:ext uri="{909E8E84-426E-40dd-AFC4-6F175D3DCCD1}">
-              <a14:hiddenFill xmlns:a14="http://schemas.microsoft.com/office/drawing/2010/main" xmlns="">
+              <a14:hiddenFill xmlns="" xmlns:a14="http://schemas.microsoft.com/office/drawing/2010/main">
                 <a:solidFill>
                   <a:srgbClr val="FFFFFF"/>
                 </a:solidFill>
@@ -7364,7 +7479,7 @@
             </a:ln>
             <a:extLst>
               <a:ext uri="{91240B29-F687-4f45-9708-019B960494DF}">
-                <a14:hiddenLine xmlns:a14="http://schemas.microsoft.com/office/drawing/2010/main" xmlns="" w="9525">
+                <a14:hiddenLine xmlns="" xmlns:a14="http://schemas.microsoft.com/office/drawing/2010/main" w="9525">
                   <a:solidFill>
                     <a:srgbClr val="000000"/>
                   </a:solidFill>
@@ -7409,14 +7524,14 @@
             </a:ln>
             <a:extLst>
               <a:ext uri="{909E8E84-426E-40dd-AFC4-6F175D3DCCD1}">
-                <a14:hiddenFill xmlns:a14="http://schemas.microsoft.com/office/drawing/2010/main" xmlns="">
+                <a14:hiddenFill xmlns="" xmlns:a14="http://schemas.microsoft.com/office/drawing/2010/main">
                   <a:solidFill>
                     <a:srgbClr val="FFFFFF"/>
                   </a:solidFill>
                 </a14:hiddenFill>
               </a:ext>
               <a:ext uri="{91240B29-F687-4f45-9708-019B960494DF}">
-                <a14:hiddenLine xmlns:a14="http://schemas.microsoft.com/office/drawing/2010/main" xmlns="" w="9525">
+                <a14:hiddenLine xmlns="" xmlns:a14="http://schemas.microsoft.com/office/drawing/2010/main" w="9525">
                   <a:solidFill>
                     <a:srgbClr val="000000"/>
                   </a:solidFill>
@@ -7516,7 +7631,7 @@
             </a:ln>
             <a:extLst>
               <a:ext uri="{91240B29-F687-4f45-9708-019B960494DF}">
-                <a14:hiddenLine xmlns:a14="http://schemas.microsoft.com/office/drawing/2010/main" xmlns="" w="9525">
+                <a14:hiddenLine xmlns="" xmlns:a14="http://schemas.microsoft.com/office/drawing/2010/main" w="9525">
                   <a:solidFill>
                     <a:srgbClr val="000000"/>
                   </a:solidFill>
@@ -7561,14 +7676,14 @@
             </a:ln>
             <a:extLst>
               <a:ext uri="{909E8E84-426E-40dd-AFC4-6F175D3DCCD1}">
-                <a14:hiddenFill xmlns:a14="http://schemas.microsoft.com/office/drawing/2010/main" xmlns="">
+                <a14:hiddenFill xmlns="" xmlns:a14="http://schemas.microsoft.com/office/drawing/2010/main">
                   <a:solidFill>
                     <a:srgbClr val="FFFFFF"/>
                   </a:solidFill>
                 </a14:hiddenFill>
               </a:ext>
               <a:ext uri="{91240B29-F687-4f45-9708-019B960494DF}">
-                <a14:hiddenLine xmlns:a14="http://schemas.microsoft.com/office/drawing/2010/main" xmlns="" w="9525">
+                <a14:hiddenLine xmlns="" xmlns:a14="http://schemas.microsoft.com/office/drawing/2010/main" w="9525">
                   <a:solidFill>
                     <a:srgbClr val="000000"/>
                   </a:solidFill>
@@ -7684,7 +7799,7 @@
             </a:ln>
             <a:extLst>
               <a:ext uri="{91240B29-F687-4f45-9708-019B960494DF}">
-                <a14:hiddenLine xmlns:a14="http://schemas.microsoft.com/office/drawing/2010/main" xmlns="" w="9525">
+                <a14:hiddenLine xmlns="" xmlns:a14="http://schemas.microsoft.com/office/drawing/2010/main" w="9525">
                   <a:solidFill>
                     <a:srgbClr val="000000"/>
                   </a:solidFill>
@@ -7729,14 +7844,14 @@
             </a:ln>
             <a:extLst>
               <a:ext uri="{909E8E84-426E-40dd-AFC4-6F175D3DCCD1}">
-                <a14:hiddenFill xmlns:a14="http://schemas.microsoft.com/office/drawing/2010/main" xmlns="">
+                <a14:hiddenFill xmlns="" xmlns:a14="http://schemas.microsoft.com/office/drawing/2010/main">
                   <a:solidFill>
                     <a:srgbClr val="FFFFFF"/>
                   </a:solidFill>
                 </a14:hiddenFill>
               </a:ext>
               <a:ext uri="{91240B29-F687-4f45-9708-019B960494DF}">
-                <a14:hiddenLine xmlns:a14="http://schemas.microsoft.com/office/drawing/2010/main" xmlns="" w="9525">
+                <a14:hiddenLine xmlns="" xmlns:a14="http://schemas.microsoft.com/office/drawing/2010/main" w="9525">
                   <a:solidFill>
                     <a:srgbClr val="000000"/>
                   </a:solidFill>
@@ -7849,7 +7964,7 @@
             </a:ln>
             <a:extLst>
               <a:ext uri="{91240B29-F687-4f45-9708-019B960494DF}">
-                <a14:hiddenLine xmlns:a14="http://schemas.microsoft.com/office/drawing/2010/main" xmlns="" w="9525">
+                <a14:hiddenLine xmlns="" xmlns:a14="http://schemas.microsoft.com/office/drawing/2010/main" w="9525">
                   <a:solidFill>
                     <a:srgbClr val="000000"/>
                   </a:solidFill>
@@ -7894,14 +8009,14 @@
             </a:ln>
             <a:extLst>
               <a:ext uri="{909E8E84-426E-40dd-AFC4-6F175D3DCCD1}">
-                <a14:hiddenFill xmlns:a14="http://schemas.microsoft.com/office/drawing/2010/main" xmlns="">
+                <a14:hiddenFill xmlns="" xmlns:a14="http://schemas.microsoft.com/office/drawing/2010/main">
                   <a:solidFill>
                     <a:srgbClr val="FFFFFF"/>
                   </a:solidFill>
                 </a14:hiddenFill>
               </a:ext>
               <a:ext uri="{91240B29-F687-4f45-9708-019B960494DF}">
-                <a14:hiddenLine xmlns:a14="http://schemas.microsoft.com/office/drawing/2010/main" xmlns="" w="9525">
+                <a14:hiddenLine xmlns="" xmlns:a14="http://schemas.microsoft.com/office/drawing/2010/main" w="9525">
                   <a:solidFill>
                     <a:srgbClr val="000000"/>
                   </a:solidFill>
@@ -8001,7 +8116,7 @@
           </a:ln>
           <a:extLst>
             <a:ext uri="{909E8E84-426E-40dd-AFC4-6F175D3DCCD1}">
-              <a14:hiddenFill xmlns:a14="http://schemas.microsoft.com/office/drawing/2010/main" xmlns="">
+              <a14:hiddenFill xmlns="" xmlns:a14="http://schemas.microsoft.com/office/drawing/2010/main">
                 <a:noFill/>
               </a14:hiddenFill>
             </a:ext>
@@ -8048,7 +8163,7 @@
             </a:ln>
             <a:extLst>
               <a:ext uri="{91240B29-F687-4f45-9708-019B960494DF}">
-                <a14:hiddenLine xmlns:a14="http://schemas.microsoft.com/office/drawing/2010/main" xmlns="" w="9525">
+                <a14:hiddenLine xmlns="" xmlns:a14="http://schemas.microsoft.com/office/drawing/2010/main" w="9525">
                   <a:solidFill>
                     <a:srgbClr val="000000"/>
                   </a:solidFill>
@@ -8093,14 +8208,14 @@
             </a:ln>
             <a:extLst>
               <a:ext uri="{909E8E84-426E-40dd-AFC4-6F175D3DCCD1}">
-                <a14:hiddenFill xmlns:a14="http://schemas.microsoft.com/office/drawing/2010/main" xmlns="">
+                <a14:hiddenFill xmlns="" xmlns:a14="http://schemas.microsoft.com/office/drawing/2010/main">
                   <a:solidFill>
                     <a:srgbClr val="FFFFFF"/>
                   </a:solidFill>
                 </a14:hiddenFill>
               </a:ext>
               <a:ext uri="{91240B29-F687-4f45-9708-019B960494DF}">
-                <a14:hiddenLine xmlns:a14="http://schemas.microsoft.com/office/drawing/2010/main" xmlns="" w="9525">
+                <a14:hiddenLine xmlns="" xmlns:a14="http://schemas.microsoft.com/office/drawing/2010/main" w="9525">
                   <a:solidFill>
                     <a:srgbClr val="000000"/>
                   </a:solidFill>
@@ -8200,7 +8315,7 @@
             </a:ln>
             <a:extLst>
               <a:ext uri="{91240B29-F687-4f45-9708-019B960494DF}">
-                <a14:hiddenLine xmlns:a14="http://schemas.microsoft.com/office/drawing/2010/main" xmlns="" w="9525">
+                <a14:hiddenLine xmlns="" xmlns:a14="http://schemas.microsoft.com/office/drawing/2010/main" w="9525">
                   <a:solidFill>
                     <a:srgbClr val="000000"/>
                   </a:solidFill>
@@ -8245,14 +8360,14 @@
             </a:ln>
             <a:extLst>
               <a:ext uri="{909E8E84-426E-40dd-AFC4-6F175D3DCCD1}">
-                <a14:hiddenFill xmlns:a14="http://schemas.microsoft.com/office/drawing/2010/main" xmlns="">
+                <a14:hiddenFill xmlns="" xmlns:a14="http://schemas.microsoft.com/office/drawing/2010/main">
                   <a:solidFill>
                     <a:srgbClr val="FFFFFF"/>
                   </a:solidFill>
                 </a14:hiddenFill>
               </a:ext>
               <a:ext uri="{91240B29-F687-4f45-9708-019B960494DF}">
-                <a14:hiddenLine xmlns:a14="http://schemas.microsoft.com/office/drawing/2010/main" xmlns="" w="9525">
+                <a14:hiddenLine xmlns="" xmlns:a14="http://schemas.microsoft.com/office/drawing/2010/main" w="9525">
                   <a:solidFill>
                     <a:srgbClr val="000000"/>
                   </a:solidFill>
@@ -8352,7 +8467,7 @@
             </a:ln>
             <a:extLst>
               <a:ext uri="{91240B29-F687-4f45-9708-019B960494DF}">
-                <a14:hiddenLine xmlns:a14="http://schemas.microsoft.com/office/drawing/2010/main" xmlns="" w="9525">
+                <a14:hiddenLine xmlns="" xmlns:a14="http://schemas.microsoft.com/office/drawing/2010/main" w="9525">
                   <a:solidFill>
                     <a:srgbClr val="000000"/>
                   </a:solidFill>
@@ -8397,14 +8512,14 @@
             </a:ln>
             <a:extLst>
               <a:ext uri="{909E8E84-426E-40dd-AFC4-6F175D3DCCD1}">
-                <a14:hiddenFill xmlns:a14="http://schemas.microsoft.com/office/drawing/2010/main" xmlns="">
+                <a14:hiddenFill xmlns="" xmlns:a14="http://schemas.microsoft.com/office/drawing/2010/main">
                   <a:solidFill>
                     <a:srgbClr val="FFFFFF"/>
                   </a:solidFill>
                 </a14:hiddenFill>
               </a:ext>
               <a:ext uri="{91240B29-F687-4f45-9708-019B960494DF}">
-                <a14:hiddenLine xmlns:a14="http://schemas.microsoft.com/office/drawing/2010/main" xmlns="" w="9525">
+                <a14:hiddenLine xmlns="" xmlns:a14="http://schemas.microsoft.com/office/drawing/2010/main" w="9525">
                   <a:solidFill>
                     <a:srgbClr val="000000"/>
                   </a:solidFill>
@@ -8506,7 +8621,7 @@
             </a:ln>
             <a:extLst>
               <a:ext uri="{91240B29-F687-4f45-9708-019B960494DF}">
-                <a14:hiddenLine xmlns:a14="http://schemas.microsoft.com/office/drawing/2010/main" xmlns="" w="9525">
+                <a14:hiddenLine xmlns="" xmlns:a14="http://schemas.microsoft.com/office/drawing/2010/main" w="9525">
                   <a:solidFill>
                     <a:srgbClr val="000000"/>
                   </a:solidFill>
@@ -8551,14 +8666,14 @@
             </a:ln>
             <a:extLst>
               <a:ext uri="{909E8E84-426E-40dd-AFC4-6F175D3DCCD1}">
-                <a14:hiddenFill xmlns:a14="http://schemas.microsoft.com/office/drawing/2010/main" xmlns="">
+                <a14:hiddenFill xmlns="" xmlns:a14="http://schemas.microsoft.com/office/drawing/2010/main">
                   <a:solidFill>
                     <a:srgbClr val="FFFFFF"/>
                   </a:solidFill>
                 </a14:hiddenFill>
               </a:ext>
               <a:ext uri="{91240B29-F687-4f45-9708-019B960494DF}">
-                <a14:hiddenLine xmlns:a14="http://schemas.microsoft.com/office/drawing/2010/main" xmlns="" w="9525">
+                <a14:hiddenLine xmlns="" xmlns:a14="http://schemas.microsoft.com/office/drawing/2010/main" w="9525">
                   <a:solidFill>
                     <a:srgbClr val="000000"/>
                   </a:solidFill>
@@ -8679,7 +8794,7 @@
             </a:ln>
             <a:extLst>
               <a:ext uri="{91240B29-F687-4f45-9708-019B960494DF}">
-                <a14:hiddenLine xmlns:a14="http://schemas.microsoft.com/office/drawing/2010/main" xmlns="" w="9525">
+                <a14:hiddenLine xmlns="" xmlns:a14="http://schemas.microsoft.com/office/drawing/2010/main" w="9525">
                   <a:solidFill>
                     <a:srgbClr val="000000"/>
                   </a:solidFill>
@@ -8724,14 +8839,14 @@
             </a:ln>
             <a:extLst>
               <a:ext uri="{909E8E84-426E-40dd-AFC4-6F175D3DCCD1}">
-                <a14:hiddenFill xmlns:a14="http://schemas.microsoft.com/office/drawing/2010/main" xmlns="">
+                <a14:hiddenFill xmlns="" xmlns:a14="http://schemas.microsoft.com/office/drawing/2010/main">
                   <a:solidFill>
                     <a:srgbClr val="FFFFFF"/>
                   </a:solidFill>
                 </a14:hiddenFill>
               </a:ext>
               <a:ext uri="{91240B29-F687-4f45-9708-019B960494DF}">
-                <a14:hiddenLine xmlns:a14="http://schemas.microsoft.com/office/drawing/2010/main" xmlns="" w="9525">
+                <a14:hiddenLine xmlns="" xmlns:a14="http://schemas.microsoft.com/office/drawing/2010/main" w="9525">
                   <a:solidFill>
                     <a:srgbClr val="000000"/>
                   </a:solidFill>
@@ -8831,7 +8946,7 @@
           </a:ln>
           <a:extLst>
             <a:ext uri="{909E8E84-426E-40dd-AFC4-6F175D3DCCD1}">
-              <a14:hiddenFill xmlns:a14="http://schemas.microsoft.com/office/drawing/2010/main" xmlns="">
+              <a14:hiddenFill xmlns="" xmlns:a14="http://schemas.microsoft.com/office/drawing/2010/main">
                 <a:noFill/>
               </a14:hiddenFill>
             </a:ext>
@@ -8878,7 +8993,7 @@
             </a:ln>
             <a:extLst>
               <a:ext uri="{91240B29-F687-4f45-9708-019B960494DF}">
-                <a14:hiddenLine xmlns:a14="http://schemas.microsoft.com/office/drawing/2010/main" xmlns="" w="9525">
+                <a14:hiddenLine xmlns="" xmlns:a14="http://schemas.microsoft.com/office/drawing/2010/main" w="9525">
                   <a:solidFill>
                     <a:srgbClr val="000000"/>
                   </a:solidFill>
@@ -8923,14 +9038,14 @@
             </a:ln>
             <a:extLst>
               <a:ext uri="{909E8E84-426E-40dd-AFC4-6F175D3DCCD1}">
-                <a14:hiddenFill xmlns:a14="http://schemas.microsoft.com/office/drawing/2010/main" xmlns="">
+                <a14:hiddenFill xmlns="" xmlns:a14="http://schemas.microsoft.com/office/drawing/2010/main">
                   <a:solidFill>
                     <a:srgbClr val="FFFFFF"/>
                   </a:solidFill>
                 </a14:hiddenFill>
               </a:ext>
               <a:ext uri="{91240B29-F687-4f45-9708-019B960494DF}">
-                <a14:hiddenLine xmlns:a14="http://schemas.microsoft.com/office/drawing/2010/main" xmlns="" w="9525">
+                <a14:hiddenLine xmlns="" xmlns:a14="http://schemas.microsoft.com/office/drawing/2010/main" w="9525">
                   <a:solidFill>
                     <a:srgbClr val="000000"/>
                   </a:solidFill>
@@ -9188,7 +9303,7 @@
             </a:ln>
             <a:extLst>
               <a:ext uri="{91240B29-F687-4f45-9708-019B960494DF}">
-                <a14:hiddenLine xmlns:a14="http://schemas.microsoft.com/office/drawing/2010/main" xmlns="" w="9525">
+                <a14:hiddenLine xmlns="" xmlns:a14="http://schemas.microsoft.com/office/drawing/2010/main" w="9525">
                   <a:solidFill>
                     <a:srgbClr val="000000"/>
                   </a:solidFill>
@@ -9233,14 +9348,14 @@
             </a:ln>
             <a:extLst>
               <a:ext uri="{909E8E84-426E-40dd-AFC4-6F175D3DCCD1}">
-                <a14:hiddenFill xmlns:a14="http://schemas.microsoft.com/office/drawing/2010/main" xmlns="">
+                <a14:hiddenFill xmlns="" xmlns:a14="http://schemas.microsoft.com/office/drawing/2010/main">
                   <a:solidFill>
                     <a:srgbClr val="FFFFFF"/>
                   </a:solidFill>
                 </a14:hiddenFill>
               </a:ext>
               <a:ext uri="{91240B29-F687-4f45-9708-019B960494DF}">
-                <a14:hiddenLine xmlns:a14="http://schemas.microsoft.com/office/drawing/2010/main" xmlns="" w="9525">
+                <a14:hiddenLine xmlns="" xmlns:a14="http://schemas.microsoft.com/office/drawing/2010/main" w="9525">
                   <a:solidFill>
                     <a:srgbClr val="000000"/>
                   </a:solidFill>
@@ -9932,7 +10047,7 @@
         <p:spPr>
           <a:xfrm>
             <a:off x="457200" y="953796"/>
-            <a:ext cx="8229600" cy="3139321"/>
+            <a:ext cx="8229600" cy="3416320"/>
           </a:xfrm>
           <a:prstGeom prst="rect">
             <a:avLst/>
@@ -10016,7 +10131,35 @@
                 <a:latin typeface="Courier" pitchFamily="2" charset="0"/>
                 <a:cs typeface="Arial" pitchFamily="-112" charset="0"/>
               </a:rPr>
-              <a:t>library(ggplot2)</a:t>
+              <a:t>library(ggplot2) # you will need to launch </a:t>
+            </a:r>
+            <a:r>
+              <a:rPr lang="en-US" b="0" dirty="0" err="1">
+                <a:latin typeface="Courier" pitchFamily="2" charset="0"/>
+                <a:cs typeface="Arial" pitchFamily="-112" charset="0"/>
+              </a:rPr>
+              <a:t>dirst</a:t>
+            </a:r>
+            <a:r>
+              <a:rPr lang="en-US" b="0" dirty="0">
+                <a:latin typeface="Courier" pitchFamily="2" charset="0"/>
+                <a:cs typeface="Arial" pitchFamily="-112" charset="0"/>
+              </a:rPr>
+              <a:t> “</a:t>
+            </a:r>
+            <a:r>
+              <a:rPr lang="en-US" b="0" dirty="0" err="1">
+                <a:latin typeface="Courier" pitchFamily="2" charset="0"/>
+                <a:cs typeface="Arial" pitchFamily="-112" charset="0"/>
+              </a:rPr>
+              <a:t>install.packages</a:t>
+            </a:r>
+            <a:r>
+              <a:rPr lang="en-US" b="0" dirty="0">
+                <a:latin typeface="Courier" pitchFamily="2" charset="0"/>
+                <a:cs typeface="Arial" pitchFamily="-112" charset="0"/>
+              </a:rPr>
+              <a:t>("ggplot2")”</a:t>
             </a:r>
           </a:p>
           <a:p>
@@ -10194,14 +10337,14 @@
           </a:ln>
           <a:extLst>
             <a:ext uri="{909E8E84-426E-40dd-AFC4-6F175D3DCCD1}">
-              <a14:hiddenFill xmlns:a14="http://schemas.microsoft.com/office/drawing/2010/main" xmlns="">
+              <a14:hiddenFill xmlns="" xmlns:a14="http://schemas.microsoft.com/office/drawing/2010/main">
                 <a:solidFill>
                   <a:srgbClr val="FFFFFF"/>
                 </a:solidFill>
               </a14:hiddenFill>
             </a:ext>
             <a:ext uri="{91240B29-F687-4f45-9708-019B960494DF}">
-              <a14:hiddenLine xmlns:a14="http://schemas.microsoft.com/office/drawing/2010/main" xmlns="" w="9525">
+              <a14:hiddenLine xmlns="" xmlns:a14="http://schemas.microsoft.com/office/drawing/2010/main" w="9525">
                 <a:solidFill>
                   <a:srgbClr val="000000"/>
                 </a:solidFill>
@@ -10211,7 +10354,7 @@
               </a14:hiddenLine>
             </a:ext>
             <a:ext uri="{FAA26D3D-D897-4be2-8F04-BA451C77F1D7}">
-              <ma14:placeholderFlag xmlns:ma14="http://schemas.microsoft.com/office/mac/drawingml/2011/main" xmlns="" val="1"/>
+              <ma14:placeholderFlag xmlns="" xmlns:ma14="http://schemas.microsoft.com/office/mac/drawingml/2011/main" val="1"/>
             </a:ext>
           </a:extLst>
         </p:spPr>
@@ -10868,7 +11011,7 @@
             </a:ln>
             <a:extLst>
               <a:ext uri="{91240B29-F687-4f45-9708-019B960494DF}">
-                <a14:hiddenLine xmlns:a14="http://schemas.microsoft.com/office/drawing/2010/main" xmlns="" w="9525">
+                <a14:hiddenLine xmlns="" xmlns:a14="http://schemas.microsoft.com/office/drawing/2010/main" w="9525">
                   <a:solidFill>
                     <a:srgbClr val="000000"/>
                   </a:solidFill>
@@ -10913,14 +11056,14 @@
             </a:ln>
             <a:extLst>
               <a:ext uri="{909E8E84-426E-40dd-AFC4-6F175D3DCCD1}">
-                <a14:hiddenFill xmlns:a14="http://schemas.microsoft.com/office/drawing/2010/main" xmlns="">
+                <a14:hiddenFill xmlns="" xmlns:a14="http://schemas.microsoft.com/office/drawing/2010/main">
                   <a:solidFill>
                     <a:srgbClr val="FFFFFF"/>
                   </a:solidFill>
                 </a14:hiddenFill>
               </a:ext>
               <a:ext uri="{91240B29-F687-4f45-9708-019B960494DF}">
-                <a14:hiddenLine xmlns:a14="http://schemas.microsoft.com/office/drawing/2010/main" xmlns="" w="9525">
+                <a14:hiddenLine xmlns="" xmlns:a14="http://schemas.microsoft.com/office/drawing/2010/main" w="9525">
                   <a:solidFill>
                     <a:srgbClr val="000000"/>
                   </a:solidFill>
@@ -11962,14 +12105,14 @@
           </a:ln>
           <a:extLst>
             <a:ext uri="{909E8E84-426E-40dd-AFC4-6F175D3DCCD1}">
-              <a14:hiddenFill xmlns:a14="http://schemas.microsoft.com/office/drawing/2010/main" xmlns="">
+              <a14:hiddenFill xmlns="" xmlns:a14="http://schemas.microsoft.com/office/drawing/2010/main">
                 <a:solidFill>
                   <a:srgbClr val="FFFFFF"/>
                 </a:solidFill>
               </a14:hiddenFill>
             </a:ext>
             <a:ext uri="{91240B29-F687-4f45-9708-019B960494DF}">
-              <a14:hiddenLine xmlns:a14="http://schemas.microsoft.com/office/drawing/2010/main" xmlns="" w="9525">
+              <a14:hiddenLine xmlns="" xmlns:a14="http://schemas.microsoft.com/office/drawing/2010/main" w="9525">
                 <a:solidFill>
                   <a:srgbClr val="000000"/>
                 </a:solidFill>
@@ -11979,7 +12122,7 @@
               </a14:hiddenLine>
             </a:ext>
             <a:ext uri="{FAA26D3D-D897-4be2-8F04-BA451C77F1D7}">
-              <ma14:placeholderFlag xmlns:ma14="http://schemas.microsoft.com/office/mac/drawingml/2011/main" xmlns="" val="1"/>
+              <ma14:placeholderFlag xmlns="" xmlns:ma14="http://schemas.microsoft.com/office/mac/drawingml/2011/main" val="1"/>
             </a:ext>
           </a:extLst>
         </p:spPr>
@@ -12486,7 +12629,7 @@
             </a:ln>
             <a:extLst>
               <a:ext uri="{91240B29-F687-4f45-9708-019B960494DF}">
-                <a14:hiddenLine xmlns:a14="http://schemas.microsoft.com/office/drawing/2010/main" xmlns="" w="9525">
+                <a14:hiddenLine xmlns="" xmlns:a14="http://schemas.microsoft.com/office/drawing/2010/main" w="9525">
                   <a:solidFill>
                     <a:srgbClr val="000000"/>
                   </a:solidFill>
@@ -12531,14 +12674,14 @@
             </a:ln>
             <a:extLst>
               <a:ext uri="{909E8E84-426E-40dd-AFC4-6F175D3DCCD1}">
-                <a14:hiddenFill xmlns:a14="http://schemas.microsoft.com/office/drawing/2010/main" xmlns="">
+                <a14:hiddenFill xmlns="" xmlns:a14="http://schemas.microsoft.com/office/drawing/2010/main">
                   <a:solidFill>
                     <a:srgbClr val="FFFFFF"/>
                   </a:solidFill>
                 </a14:hiddenFill>
               </a:ext>
               <a:ext uri="{91240B29-F687-4f45-9708-019B960494DF}">
-                <a14:hiddenLine xmlns:a14="http://schemas.microsoft.com/office/drawing/2010/main" xmlns="" w="9525">
+                <a14:hiddenLine xmlns="" xmlns:a14="http://schemas.microsoft.com/office/drawing/2010/main" w="9525">
                   <a:solidFill>
                     <a:srgbClr val="000000"/>
                   </a:solidFill>
@@ -13189,14 +13332,14 @@
           </a:ln>
           <a:extLst>
             <a:ext uri="{909E8E84-426E-40dd-AFC4-6F175D3DCCD1}">
-              <a14:hiddenFill xmlns:a14="http://schemas.microsoft.com/office/drawing/2010/main" xmlns="">
+              <a14:hiddenFill xmlns="" xmlns:a14="http://schemas.microsoft.com/office/drawing/2010/main">
                 <a:solidFill>
                   <a:srgbClr val="FFFFFF"/>
                 </a:solidFill>
               </a14:hiddenFill>
             </a:ext>
             <a:ext uri="{91240B29-F687-4f45-9708-019B960494DF}">
-              <a14:hiddenLine xmlns:a14="http://schemas.microsoft.com/office/drawing/2010/main" xmlns="" w="9525">
+              <a14:hiddenLine xmlns="" xmlns:a14="http://schemas.microsoft.com/office/drawing/2010/main" w="9525">
                 <a:solidFill>
                   <a:srgbClr val="000000"/>
                 </a:solidFill>
@@ -13206,7 +13349,7 @@
               </a14:hiddenLine>
             </a:ext>
             <a:ext uri="{FAA26D3D-D897-4be2-8F04-BA451C77F1D7}">
-              <ma14:placeholderFlag xmlns:ma14="http://schemas.microsoft.com/office/mac/drawingml/2011/main" xmlns="" val="1"/>
+              <ma14:placeholderFlag xmlns="" xmlns:ma14="http://schemas.microsoft.com/office/mac/drawingml/2011/main" val="1"/>
             </a:ext>
           </a:extLst>
         </p:spPr>
@@ -13473,14 +13616,14 @@
           </a:ln>
           <a:extLst>
             <a:ext uri="{909E8E84-426E-40dd-AFC4-6F175D3DCCD1}">
-              <a14:hiddenFill xmlns:a14="http://schemas.microsoft.com/office/drawing/2010/main" xmlns="">
+              <a14:hiddenFill xmlns="" xmlns:a14="http://schemas.microsoft.com/office/drawing/2010/main">
                 <a:solidFill>
                   <a:srgbClr val="FFFFFF"/>
                 </a:solidFill>
               </a14:hiddenFill>
             </a:ext>
             <a:ext uri="{91240B29-F687-4f45-9708-019B960494DF}">
-              <a14:hiddenLine xmlns:a14="http://schemas.microsoft.com/office/drawing/2010/main" xmlns="" w="9525">
+              <a14:hiddenLine xmlns="" xmlns:a14="http://schemas.microsoft.com/office/drawing/2010/main" w="9525">
                 <a:solidFill>
                   <a:srgbClr val="000000"/>
                 </a:solidFill>
@@ -13937,7 +14080,7 @@
             </a:ln>
             <a:extLst>
               <a:ext uri="{91240B29-F687-4f45-9708-019B960494DF}">
-                <a14:hiddenLine xmlns:a14="http://schemas.microsoft.com/office/drawing/2010/main" xmlns="" w="9525">
+                <a14:hiddenLine xmlns="" xmlns:a14="http://schemas.microsoft.com/office/drawing/2010/main" w="9525">
                   <a:solidFill>
                     <a:srgbClr val="000000"/>
                   </a:solidFill>
@@ -13982,14 +14125,14 @@
             </a:ln>
             <a:extLst>
               <a:ext uri="{909E8E84-426E-40dd-AFC4-6F175D3DCCD1}">
-                <a14:hiddenFill xmlns:a14="http://schemas.microsoft.com/office/drawing/2010/main" xmlns="">
+                <a14:hiddenFill xmlns="" xmlns:a14="http://schemas.microsoft.com/office/drawing/2010/main">
                   <a:solidFill>
                     <a:srgbClr val="FFFFFF"/>
                   </a:solidFill>
                 </a14:hiddenFill>
               </a:ext>
               <a:ext uri="{91240B29-F687-4f45-9708-019B960494DF}">
-                <a14:hiddenLine xmlns:a14="http://schemas.microsoft.com/office/drawing/2010/main" xmlns="" w="9525">
+                <a14:hiddenLine xmlns="" xmlns:a14="http://schemas.microsoft.com/office/drawing/2010/main" w="9525">
                   <a:solidFill>
                     <a:srgbClr val="000000"/>
                   </a:solidFill>
@@ -14068,14 +14211,14 @@
           </a:ln>
           <a:extLst>
             <a:ext uri="{909E8E84-426E-40dd-AFC4-6F175D3DCCD1}">
-              <a14:hiddenFill xmlns:a14="http://schemas.microsoft.com/office/drawing/2010/main" xmlns="">
+              <a14:hiddenFill xmlns="" xmlns:a14="http://schemas.microsoft.com/office/drawing/2010/main">
                 <a:solidFill>
                   <a:srgbClr val="FFFFFF"/>
                 </a:solidFill>
               </a14:hiddenFill>
             </a:ext>
             <a:ext uri="{91240B29-F687-4f45-9708-019B960494DF}">
-              <a14:hiddenLine xmlns:a14="http://schemas.microsoft.com/office/drawing/2010/main" xmlns="" w="9525">
+              <a14:hiddenLine xmlns="" xmlns:a14="http://schemas.microsoft.com/office/drawing/2010/main" w="9525">
                 <a:solidFill>
                   <a:srgbClr val="000000"/>
                 </a:solidFill>
@@ -14085,7 +14228,7 @@
               </a14:hiddenLine>
             </a:ext>
             <a:ext uri="{FAA26D3D-D897-4be2-8F04-BA451C77F1D7}">
-              <ma14:placeholderFlag xmlns:ma14="http://schemas.microsoft.com/office/mac/drawingml/2011/main" xmlns="" val="1"/>
+              <ma14:placeholderFlag xmlns="" xmlns:ma14="http://schemas.microsoft.com/office/mac/drawingml/2011/main" val="1"/>
             </a:ext>
           </a:extLst>
         </p:spPr>
@@ -14426,14 +14569,14 @@
             </a:ln>
             <a:extLst>
               <a:ext uri="{909E8E84-426E-40dd-AFC4-6F175D3DCCD1}">
-                <a14:hiddenFill xmlns:a14="http://schemas.microsoft.com/office/drawing/2010/main" xmlns="">
+                <a14:hiddenFill xmlns="" xmlns:a14="http://schemas.microsoft.com/office/drawing/2010/main">
                   <a:solidFill>
                     <a:srgbClr val="FFFFFF"/>
                   </a:solidFill>
                 </a14:hiddenFill>
               </a:ext>
               <a:ext uri="{91240B29-F687-4f45-9708-019B960494DF}">
-                <a14:hiddenLine xmlns:a14="http://schemas.microsoft.com/office/drawing/2010/main" xmlns="" w="9525">
+                <a14:hiddenLine xmlns="" xmlns:a14="http://schemas.microsoft.com/office/drawing/2010/main" w="9525">
                   <a:solidFill>
                     <a:srgbClr val="000000"/>
                   </a:solidFill>
@@ -14941,7 +15084,7 @@
             </a:ln>
             <a:extLst>
               <a:ext uri="{91240B29-F687-4f45-9708-019B960494DF}">
-                <a14:hiddenLine xmlns:a14="http://schemas.microsoft.com/office/drawing/2010/main" xmlns="" w="9525">
+                <a14:hiddenLine xmlns="" xmlns:a14="http://schemas.microsoft.com/office/drawing/2010/main" w="9525">
                   <a:solidFill>
                     <a:srgbClr val="000000"/>
                   </a:solidFill>
@@ -14986,14 +15129,14 @@
             </a:ln>
             <a:extLst>
               <a:ext uri="{909E8E84-426E-40dd-AFC4-6F175D3DCCD1}">
-                <a14:hiddenFill xmlns:a14="http://schemas.microsoft.com/office/drawing/2010/main" xmlns="">
+                <a14:hiddenFill xmlns="" xmlns:a14="http://schemas.microsoft.com/office/drawing/2010/main">
                   <a:solidFill>
                     <a:srgbClr val="FFFFFF"/>
                   </a:solidFill>
                 </a14:hiddenFill>
               </a:ext>
               <a:ext uri="{91240B29-F687-4f45-9708-019B960494DF}">
-                <a14:hiddenLine xmlns:a14="http://schemas.microsoft.com/office/drawing/2010/main" xmlns="" w="9525">
+                <a14:hiddenLine xmlns="" xmlns:a14="http://schemas.microsoft.com/office/drawing/2010/main" w="9525">
                   <a:solidFill>
                     <a:srgbClr val="000000"/>
                   </a:solidFill>
@@ -15093,7 +15236,7 @@
             </a:ln>
             <a:extLst>
               <a:ext uri="{91240B29-F687-4f45-9708-019B960494DF}">
-                <a14:hiddenLine xmlns:a14="http://schemas.microsoft.com/office/drawing/2010/main" xmlns="" w="9525">
+                <a14:hiddenLine xmlns="" xmlns:a14="http://schemas.microsoft.com/office/drawing/2010/main" w="9525">
                   <a:solidFill>
                     <a:srgbClr val="000000"/>
                   </a:solidFill>
@@ -15138,14 +15281,14 @@
             </a:ln>
             <a:extLst>
               <a:ext uri="{909E8E84-426E-40dd-AFC4-6F175D3DCCD1}">
-                <a14:hiddenFill xmlns:a14="http://schemas.microsoft.com/office/drawing/2010/main" xmlns="">
+                <a14:hiddenFill xmlns="" xmlns:a14="http://schemas.microsoft.com/office/drawing/2010/main">
                   <a:solidFill>
                     <a:srgbClr val="FFFFFF"/>
                   </a:solidFill>
                 </a14:hiddenFill>
               </a:ext>
               <a:ext uri="{91240B29-F687-4f45-9708-019B960494DF}">
-                <a14:hiddenLine xmlns:a14="http://schemas.microsoft.com/office/drawing/2010/main" xmlns="" w="9525">
+                <a14:hiddenLine xmlns="" xmlns:a14="http://schemas.microsoft.com/office/drawing/2010/main" w="9525">
                   <a:solidFill>
                     <a:srgbClr val="000000"/>
                   </a:solidFill>
@@ -15261,7 +15404,7 @@
             </a:ln>
             <a:extLst>
               <a:ext uri="{91240B29-F687-4f45-9708-019B960494DF}">
-                <a14:hiddenLine xmlns:a14="http://schemas.microsoft.com/office/drawing/2010/main" xmlns="" w="9525">
+                <a14:hiddenLine xmlns="" xmlns:a14="http://schemas.microsoft.com/office/drawing/2010/main" w="9525">
                   <a:solidFill>
                     <a:srgbClr val="000000"/>
                   </a:solidFill>
@@ -15306,14 +15449,14 @@
             </a:ln>
             <a:extLst>
               <a:ext uri="{909E8E84-426E-40dd-AFC4-6F175D3DCCD1}">
-                <a14:hiddenFill xmlns:a14="http://schemas.microsoft.com/office/drawing/2010/main" xmlns="">
+                <a14:hiddenFill xmlns="" xmlns:a14="http://schemas.microsoft.com/office/drawing/2010/main">
                   <a:solidFill>
                     <a:srgbClr val="FFFFFF"/>
                   </a:solidFill>
                 </a14:hiddenFill>
               </a:ext>
               <a:ext uri="{91240B29-F687-4f45-9708-019B960494DF}">
-                <a14:hiddenLine xmlns:a14="http://schemas.microsoft.com/office/drawing/2010/main" xmlns="" w="9525">
+                <a14:hiddenLine xmlns="" xmlns:a14="http://schemas.microsoft.com/office/drawing/2010/main" w="9525">
                   <a:solidFill>
                     <a:srgbClr val="000000"/>
                   </a:solidFill>
@@ -15426,7 +15569,7 @@
             </a:ln>
             <a:extLst>
               <a:ext uri="{91240B29-F687-4f45-9708-019B960494DF}">
-                <a14:hiddenLine xmlns:a14="http://schemas.microsoft.com/office/drawing/2010/main" xmlns="" w="9525">
+                <a14:hiddenLine xmlns="" xmlns:a14="http://schemas.microsoft.com/office/drawing/2010/main" w="9525">
                   <a:solidFill>
                     <a:srgbClr val="000000"/>
                   </a:solidFill>
@@ -15471,14 +15614,14 @@
             </a:ln>
             <a:extLst>
               <a:ext uri="{909E8E84-426E-40dd-AFC4-6F175D3DCCD1}">
-                <a14:hiddenFill xmlns:a14="http://schemas.microsoft.com/office/drawing/2010/main" xmlns="">
+                <a14:hiddenFill xmlns="" xmlns:a14="http://schemas.microsoft.com/office/drawing/2010/main">
                   <a:solidFill>
                     <a:srgbClr val="FFFFFF"/>
                   </a:solidFill>
                 </a14:hiddenFill>
               </a:ext>
               <a:ext uri="{91240B29-F687-4f45-9708-019B960494DF}">
-                <a14:hiddenLine xmlns:a14="http://schemas.microsoft.com/office/drawing/2010/main" xmlns="" w="9525">
+                <a14:hiddenLine xmlns="" xmlns:a14="http://schemas.microsoft.com/office/drawing/2010/main" w="9525">
                   <a:solidFill>
                     <a:srgbClr val="000000"/>
                   </a:solidFill>
@@ -15578,7 +15721,7 @@
           </a:ln>
           <a:extLst>
             <a:ext uri="{909E8E84-426E-40dd-AFC4-6F175D3DCCD1}">
-              <a14:hiddenFill xmlns:a14="http://schemas.microsoft.com/office/drawing/2010/main" xmlns="">
+              <a14:hiddenFill xmlns="" xmlns:a14="http://schemas.microsoft.com/office/drawing/2010/main">
                 <a:noFill/>
               </a14:hiddenFill>
             </a:ext>
@@ -15625,7 +15768,7 @@
             </a:ln>
             <a:extLst>
               <a:ext uri="{91240B29-F687-4f45-9708-019B960494DF}">
-                <a14:hiddenLine xmlns:a14="http://schemas.microsoft.com/office/drawing/2010/main" xmlns="" w="9525">
+                <a14:hiddenLine xmlns="" xmlns:a14="http://schemas.microsoft.com/office/drawing/2010/main" w="9525">
                   <a:solidFill>
                     <a:srgbClr val="000000"/>
                   </a:solidFill>
@@ -15670,14 +15813,14 @@
             </a:ln>
             <a:extLst>
               <a:ext uri="{909E8E84-426E-40dd-AFC4-6F175D3DCCD1}">
-                <a14:hiddenFill xmlns:a14="http://schemas.microsoft.com/office/drawing/2010/main" xmlns="">
+                <a14:hiddenFill xmlns="" xmlns:a14="http://schemas.microsoft.com/office/drawing/2010/main">
                   <a:solidFill>
                     <a:srgbClr val="FFFFFF"/>
                   </a:solidFill>
                 </a14:hiddenFill>
               </a:ext>
               <a:ext uri="{91240B29-F687-4f45-9708-019B960494DF}">
-                <a14:hiddenLine xmlns:a14="http://schemas.microsoft.com/office/drawing/2010/main" xmlns="" w="9525">
+                <a14:hiddenLine xmlns="" xmlns:a14="http://schemas.microsoft.com/office/drawing/2010/main" w="9525">
                   <a:solidFill>
                     <a:srgbClr val="000000"/>
                   </a:solidFill>
@@ -15777,7 +15920,7 @@
             </a:ln>
             <a:extLst>
               <a:ext uri="{91240B29-F687-4f45-9708-019B960494DF}">
-                <a14:hiddenLine xmlns:a14="http://schemas.microsoft.com/office/drawing/2010/main" xmlns="" w="9525">
+                <a14:hiddenLine xmlns="" xmlns:a14="http://schemas.microsoft.com/office/drawing/2010/main" w="9525">
                   <a:solidFill>
                     <a:srgbClr val="000000"/>
                   </a:solidFill>
@@ -15822,14 +15965,14 @@
             </a:ln>
             <a:extLst>
               <a:ext uri="{909E8E84-426E-40dd-AFC4-6F175D3DCCD1}">
-                <a14:hiddenFill xmlns:a14="http://schemas.microsoft.com/office/drawing/2010/main" xmlns="">
+                <a14:hiddenFill xmlns="" xmlns:a14="http://schemas.microsoft.com/office/drawing/2010/main">
                   <a:solidFill>
                     <a:srgbClr val="FFFFFF"/>
                   </a:solidFill>
                 </a14:hiddenFill>
               </a:ext>
               <a:ext uri="{91240B29-F687-4f45-9708-019B960494DF}">
-                <a14:hiddenLine xmlns:a14="http://schemas.microsoft.com/office/drawing/2010/main" xmlns="" w="9525">
+                <a14:hiddenLine xmlns="" xmlns:a14="http://schemas.microsoft.com/office/drawing/2010/main" w="9525">
                   <a:solidFill>
                     <a:srgbClr val="000000"/>
                   </a:solidFill>
@@ -15929,7 +16072,7 @@
             </a:ln>
             <a:extLst>
               <a:ext uri="{91240B29-F687-4f45-9708-019B960494DF}">
-                <a14:hiddenLine xmlns:a14="http://schemas.microsoft.com/office/drawing/2010/main" xmlns="" w="9525">
+                <a14:hiddenLine xmlns="" xmlns:a14="http://schemas.microsoft.com/office/drawing/2010/main" w="9525">
                   <a:solidFill>
                     <a:srgbClr val="000000"/>
                   </a:solidFill>
@@ -15974,14 +16117,14 @@
             </a:ln>
             <a:extLst>
               <a:ext uri="{909E8E84-426E-40dd-AFC4-6F175D3DCCD1}">
-                <a14:hiddenFill xmlns:a14="http://schemas.microsoft.com/office/drawing/2010/main" xmlns="">
+                <a14:hiddenFill xmlns="" xmlns:a14="http://schemas.microsoft.com/office/drawing/2010/main">
                   <a:solidFill>
                     <a:srgbClr val="FFFFFF"/>
                   </a:solidFill>
                 </a14:hiddenFill>
               </a:ext>
               <a:ext uri="{91240B29-F687-4f45-9708-019B960494DF}">
-                <a14:hiddenLine xmlns:a14="http://schemas.microsoft.com/office/drawing/2010/main" xmlns="" w="9525">
+                <a14:hiddenLine xmlns="" xmlns:a14="http://schemas.microsoft.com/office/drawing/2010/main" w="9525">
                   <a:solidFill>
                     <a:srgbClr val="000000"/>
                   </a:solidFill>
@@ -16083,7 +16226,7 @@
             </a:ln>
             <a:extLst>
               <a:ext uri="{91240B29-F687-4f45-9708-019B960494DF}">
-                <a14:hiddenLine xmlns:a14="http://schemas.microsoft.com/office/drawing/2010/main" xmlns="" w="9525">
+                <a14:hiddenLine xmlns="" xmlns:a14="http://schemas.microsoft.com/office/drawing/2010/main" w="9525">
                   <a:solidFill>
                     <a:srgbClr val="000000"/>
                   </a:solidFill>
@@ -16128,14 +16271,14 @@
             </a:ln>
             <a:extLst>
               <a:ext uri="{909E8E84-426E-40dd-AFC4-6F175D3DCCD1}">
-                <a14:hiddenFill xmlns:a14="http://schemas.microsoft.com/office/drawing/2010/main" xmlns="">
+                <a14:hiddenFill xmlns="" xmlns:a14="http://schemas.microsoft.com/office/drawing/2010/main">
                   <a:solidFill>
                     <a:srgbClr val="FFFFFF"/>
                   </a:solidFill>
                 </a14:hiddenFill>
               </a:ext>
               <a:ext uri="{91240B29-F687-4f45-9708-019B960494DF}">
-                <a14:hiddenLine xmlns:a14="http://schemas.microsoft.com/office/drawing/2010/main" xmlns="" w="9525">
+                <a14:hiddenLine xmlns="" xmlns:a14="http://schemas.microsoft.com/office/drawing/2010/main" w="9525">
                   <a:solidFill>
                     <a:srgbClr val="000000"/>
                   </a:solidFill>
@@ -16256,7 +16399,7 @@
             </a:ln>
             <a:extLst>
               <a:ext uri="{91240B29-F687-4f45-9708-019B960494DF}">
-                <a14:hiddenLine xmlns:a14="http://schemas.microsoft.com/office/drawing/2010/main" xmlns="" w="9525">
+                <a14:hiddenLine xmlns="" xmlns:a14="http://schemas.microsoft.com/office/drawing/2010/main" w="9525">
                   <a:solidFill>
                     <a:srgbClr val="000000"/>
                   </a:solidFill>
@@ -16301,14 +16444,14 @@
             </a:ln>
             <a:extLst>
               <a:ext uri="{909E8E84-426E-40dd-AFC4-6F175D3DCCD1}">
-                <a14:hiddenFill xmlns:a14="http://schemas.microsoft.com/office/drawing/2010/main" xmlns="">
+                <a14:hiddenFill xmlns="" xmlns:a14="http://schemas.microsoft.com/office/drawing/2010/main">
                   <a:solidFill>
                     <a:srgbClr val="FFFFFF"/>
                   </a:solidFill>
                 </a14:hiddenFill>
               </a:ext>
               <a:ext uri="{91240B29-F687-4f45-9708-019B960494DF}">
-                <a14:hiddenLine xmlns:a14="http://schemas.microsoft.com/office/drawing/2010/main" xmlns="" w="9525">
+                <a14:hiddenLine xmlns="" xmlns:a14="http://schemas.microsoft.com/office/drawing/2010/main" w="9525">
                   <a:solidFill>
                     <a:srgbClr val="000000"/>
                   </a:solidFill>
@@ -16408,7 +16551,7 @@
           </a:ln>
           <a:extLst>
             <a:ext uri="{909E8E84-426E-40dd-AFC4-6F175D3DCCD1}">
-              <a14:hiddenFill xmlns:a14="http://schemas.microsoft.com/office/drawing/2010/main" xmlns="">
+              <a14:hiddenFill xmlns="" xmlns:a14="http://schemas.microsoft.com/office/drawing/2010/main">
                 <a:noFill/>
               </a14:hiddenFill>
             </a:ext>
@@ -16455,7 +16598,7 @@
             </a:ln>
             <a:extLst>
               <a:ext uri="{91240B29-F687-4f45-9708-019B960494DF}">
-                <a14:hiddenLine xmlns:a14="http://schemas.microsoft.com/office/drawing/2010/main" xmlns="" w="9525">
+                <a14:hiddenLine xmlns="" xmlns:a14="http://schemas.microsoft.com/office/drawing/2010/main" w="9525">
                   <a:solidFill>
                     <a:srgbClr val="000000"/>
                   </a:solidFill>
@@ -16500,14 +16643,14 @@
             </a:ln>
             <a:extLst>
               <a:ext uri="{909E8E84-426E-40dd-AFC4-6F175D3DCCD1}">
-                <a14:hiddenFill xmlns:a14="http://schemas.microsoft.com/office/drawing/2010/main" xmlns="">
+                <a14:hiddenFill xmlns="" xmlns:a14="http://schemas.microsoft.com/office/drawing/2010/main">
                   <a:solidFill>
                     <a:srgbClr val="FFFFFF"/>
                   </a:solidFill>
                 </a14:hiddenFill>
               </a:ext>
               <a:ext uri="{91240B29-F687-4f45-9708-019B960494DF}">
-                <a14:hiddenLine xmlns:a14="http://schemas.microsoft.com/office/drawing/2010/main" xmlns="" w="9525">
+                <a14:hiddenLine xmlns="" xmlns:a14="http://schemas.microsoft.com/office/drawing/2010/main" w="9525">
                   <a:solidFill>
                     <a:srgbClr val="000000"/>
                   </a:solidFill>
@@ -16708,7 +16851,7 @@
             </a:ln>
             <a:extLst>
               <a:ext uri="{91240B29-F687-4f45-9708-019B960494DF}">
-                <a14:hiddenLine xmlns:a14="http://schemas.microsoft.com/office/drawing/2010/main" xmlns="" w="9525">
+                <a14:hiddenLine xmlns="" xmlns:a14="http://schemas.microsoft.com/office/drawing/2010/main" w="9525">
                   <a:solidFill>
                     <a:srgbClr val="000000"/>
                   </a:solidFill>
@@ -16753,14 +16896,14 @@
             </a:ln>
             <a:extLst>
               <a:ext uri="{909E8E84-426E-40dd-AFC4-6F175D3DCCD1}">
-                <a14:hiddenFill xmlns:a14="http://schemas.microsoft.com/office/drawing/2010/main" xmlns="">
+                <a14:hiddenFill xmlns="" xmlns:a14="http://schemas.microsoft.com/office/drawing/2010/main">
                   <a:solidFill>
                     <a:srgbClr val="FFFFFF"/>
                   </a:solidFill>
                 </a14:hiddenFill>
               </a:ext>
               <a:ext uri="{91240B29-F687-4f45-9708-019B960494DF}">
-                <a14:hiddenLine xmlns:a14="http://schemas.microsoft.com/office/drawing/2010/main" xmlns="" w="9525">
+                <a14:hiddenLine xmlns="" xmlns:a14="http://schemas.microsoft.com/office/drawing/2010/main" w="9525">
                   <a:solidFill>
                     <a:srgbClr val="000000"/>
                   </a:solidFill>
@@ -17889,7 +18032,7 @@
             </a:ln>
             <a:extLst>
               <a:ext uri="{91240B29-F687-4f45-9708-019B960494DF}">
-                <a14:hiddenLine xmlns:a14="http://schemas.microsoft.com/office/drawing/2010/main" xmlns="" w="9525">
+                <a14:hiddenLine xmlns="" xmlns:a14="http://schemas.microsoft.com/office/drawing/2010/main" w="9525">
                   <a:solidFill>
                     <a:srgbClr val="000000"/>
                   </a:solidFill>
@@ -17934,14 +18077,14 @@
             </a:ln>
             <a:extLst>
               <a:ext uri="{909E8E84-426E-40dd-AFC4-6F175D3DCCD1}">
-                <a14:hiddenFill xmlns:a14="http://schemas.microsoft.com/office/drawing/2010/main" xmlns="">
+                <a14:hiddenFill xmlns="" xmlns:a14="http://schemas.microsoft.com/office/drawing/2010/main">
                   <a:solidFill>
                     <a:srgbClr val="FFFFFF"/>
                   </a:solidFill>
                 </a14:hiddenFill>
               </a:ext>
               <a:ext uri="{91240B29-F687-4f45-9708-019B960494DF}">
-                <a14:hiddenLine xmlns:a14="http://schemas.microsoft.com/office/drawing/2010/main" xmlns="" w="9525">
+                <a14:hiddenLine xmlns="" xmlns:a14="http://schemas.microsoft.com/office/drawing/2010/main" w="9525">
                   <a:solidFill>
                     <a:srgbClr val="000000"/>
                   </a:solidFill>
@@ -18100,14 +18243,14 @@
             </a:ln>
             <a:extLst>
               <a:ext uri="{909E8E84-426E-40dd-AFC4-6F175D3DCCD1}">
-                <a14:hiddenFill xmlns:a14="http://schemas.microsoft.com/office/drawing/2010/main" xmlns="">
+                <a14:hiddenFill xmlns="" xmlns:a14="http://schemas.microsoft.com/office/drawing/2010/main">
                   <a:solidFill>
                     <a:srgbClr val="FFFFFF"/>
                   </a:solidFill>
                 </a14:hiddenFill>
               </a:ext>
               <a:ext uri="{91240B29-F687-4f45-9708-019B960494DF}">
-                <a14:hiddenLine xmlns:a14="http://schemas.microsoft.com/office/drawing/2010/main" xmlns="" w="9525">
+                <a14:hiddenLine xmlns="" xmlns:a14="http://schemas.microsoft.com/office/drawing/2010/main" w="9525">
                   <a:solidFill>
                     <a:srgbClr val="000000"/>
                   </a:solidFill>
@@ -18299,7 +18442,7 @@
             </a:ln>
             <a:extLst>
               <a:ext uri="{909E8E84-426E-40dd-AFC4-6F175D3DCCD1}">
-                <a14:hiddenFill xmlns:a14="http://schemas.microsoft.com/office/drawing/2010/main" xmlns="">
+                <a14:hiddenFill xmlns="" xmlns:a14="http://schemas.microsoft.com/office/drawing/2010/main">
                   <a:noFill/>
                 </a14:hiddenFill>
               </a:ext>
@@ -18345,14 +18488,14 @@
             </a:ln>
             <a:extLst>
               <a:ext uri="{909E8E84-426E-40dd-AFC4-6F175D3DCCD1}">
-                <a14:hiddenFill xmlns:a14="http://schemas.microsoft.com/office/drawing/2010/main" xmlns="">
+                <a14:hiddenFill xmlns="" xmlns:a14="http://schemas.microsoft.com/office/drawing/2010/main">
                   <a:solidFill>
                     <a:srgbClr val="FFFFFF"/>
                   </a:solidFill>
                 </a14:hiddenFill>
               </a:ext>
               <a:ext uri="{91240B29-F687-4f45-9708-019B960494DF}">
-                <a14:hiddenLine xmlns:a14="http://schemas.microsoft.com/office/drawing/2010/main" xmlns="" w="9525">
+                <a14:hiddenLine xmlns="" xmlns:a14="http://schemas.microsoft.com/office/drawing/2010/main" w="9525">
                   <a:solidFill>
                     <a:srgbClr val="000000"/>
                   </a:solidFill>
@@ -18544,7 +18687,7 @@
             </a:ln>
             <a:extLst>
               <a:ext uri="{909E8E84-426E-40dd-AFC4-6F175D3DCCD1}">
-                <a14:hiddenFill xmlns:a14="http://schemas.microsoft.com/office/drawing/2010/main" xmlns="">
+                <a14:hiddenFill xmlns="" xmlns:a14="http://schemas.microsoft.com/office/drawing/2010/main">
                   <a:noFill/>
                 </a14:hiddenFill>
               </a:ext>
@@ -18727,7 +18870,7 @@
           <a:effectLst/>
           <a:extLst>
             <a:ext uri="{FAA26D3D-D897-4be2-8F04-BA451C77F1D7}">
-              <ma14:placeholderFlag xmlns:ma14="http://schemas.microsoft.com/office/mac/drawingml/2011/main" xmlns="" val="1"/>
+              <ma14:placeholderFlag xmlns="" xmlns:ma14="http://schemas.microsoft.com/office/mac/drawingml/2011/main" val="1"/>
             </a:ext>
           </a:extLst>
         </p:spPr>
@@ -18920,14 +19063,14 @@
           </a:ln>
           <a:extLst>
             <a:ext uri="{909E8E84-426E-40dd-AFC4-6F175D3DCCD1}">
-              <a14:hiddenFill xmlns:a14="http://schemas.microsoft.com/office/drawing/2010/main" xmlns="">
+              <a14:hiddenFill xmlns="" xmlns:a14="http://schemas.microsoft.com/office/drawing/2010/main">
                 <a:solidFill>
                   <a:srgbClr val="FFFFFF"/>
                 </a:solidFill>
               </a14:hiddenFill>
             </a:ext>
             <a:ext uri="{91240B29-F687-4f45-9708-019B960494DF}">
-              <a14:hiddenLine xmlns:a14="http://schemas.microsoft.com/office/drawing/2010/main" xmlns="" w="9525">
+              <a14:hiddenLine xmlns="" xmlns:a14="http://schemas.microsoft.com/office/drawing/2010/main" w="9525">
                 <a:solidFill>
                   <a:srgbClr val="000000"/>
                 </a:solidFill>
@@ -18937,7 +19080,7 @@
               </a14:hiddenLine>
             </a:ext>
             <a:ext uri="{FAA26D3D-D897-4be2-8F04-BA451C77F1D7}">
-              <ma14:placeholderFlag xmlns:ma14="http://schemas.microsoft.com/office/mac/drawingml/2011/main" xmlns="" val="1"/>
+              <ma14:placeholderFlag xmlns="" xmlns:ma14="http://schemas.microsoft.com/office/mac/drawingml/2011/main" val="1"/>
             </a:ext>
           </a:extLst>
         </p:spPr>
@@ -19651,14 +19794,14 @@
           </a:ln>
           <a:extLst>
             <a:ext uri="{909E8E84-426E-40dd-AFC4-6F175D3DCCD1}">
-              <a14:hiddenFill xmlns:a14="http://schemas.microsoft.com/office/drawing/2010/main" xmlns="">
+              <a14:hiddenFill xmlns="" xmlns:a14="http://schemas.microsoft.com/office/drawing/2010/main">
                 <a:solidFill>
                   <a:srgbClr val="FFFFFF"/>
                 </a:solidFill>
               </a14:hiddenFill>
             </a:ext>
             <a:ext uri="{91240B29-F687-4f45-9708-019B960494DF}">
-              <a14:hiddenLine xmlns:a14="http://schemas.microsoft.com/office/drawing/2010/main" xmlns="" w="9525">
+              <a14:hiddenLine xmlns="" xmlns:a14="http://schemas.microsoft.com/office/drawing/2010/main" w="9525">
                 <a:solidFill>
                   <a:srgbClr val="000000"/>
                 </a:solidFill>
@@ -19668,7 +19811,7 @@
               </a14:hiddenLine>
             </a:ext>
             <a:ext uri="{FAA26D3D-D897-4be2-8F04-BA451C77F1D7}">
-              <ma14:placeholderFlag xmlns:ma14="http://schemas.microsoft.com/office/mac/drawingml/2011/main" xmlns="" val="1"/>
+              <ma14:placeholderFlag xmlns="" xmlns:ma14="http://schemas.microsoft.com/office/mac/drawingml/2011/main" val="1"/>
             </a:ext>
           </a:extLst>
         </p:spPr>
@@ -19966,7 +20109,7 @@
           </a:ln>
           <a:extLst>
             <a:ext uri="{91240B29-F687-4f45-9708-019B960494DF}">
-              <a14:hiddenLine xmlns:a14="http://schemas.microsoft.com/office/drawing/2010/main" xmlns="" w="9525">
+              <a14:hiddenLine xmlns="" xmlns:a14="http://schemas.microsoft.com/office/drawing/2010/main" w="9525">
                 <a:solidFill>
                   <a:srgbClr val="000000"/>
                 </a:solidFill>
@@ -20306,7 +20449,7 @@
           </a:ln>
           <a:extLst>
             <a:ext uri="{91240B29-F687-4f45-9708-019B960494DF}">
-              <a14:hiddenLine xmlns:a14="http://schemas.microsoft.com/office/drawing/2010/main" xmlns="" w="9525">
+              <a14:hiddenLine xmlns="" xmlns:a14="http://schemas.microsoft.com/office/drawing/2010/main" w="9525">
                 <a:solidFill>
                   <a:srgbClr val="000000"/>
                 </a:solidFill>
@@ -21394,14 +21537,14 @@
           </a:ln>
           <a:extLst>
             <a:ext uri="{909E8E84-426E-40dd-AFC4-6F175D3DCCD1}">
-              <a14:hiddenFill xmlns:a14="http://schemas.microsoft.com/office/drawing/2010/main" xmlns="">
+              <a14:hiddenFill xmlns="" xmlns:a14="http://schemas.microsoft.com/office/drawing/2010/main">
                 <a:solidFill>
                   <a:srgbClr val="FFFFFF"/>
                 </a:solidFill>
               </a14:hiddenFill>
             </a:ext>
             <a:ext uri="{91240B29-F687-4f45-9708-019B960494DF}">
-              <a14:hiddenLine xmlns:a14="http://schemas.microsoft.com/office/drawing/2010/main" xmlns="" w="9525">
+              <a14:hiddenLine xmlns="" xmlns:a14="http://schemas.microsoft.com/office/drawing/2010/main" w="9525">
                 <a:solidFill>
                   <a:srgbClr val="000000"/>
                 </a:solidFill>
@@ -21411,7 +21554,7 @@
               </a14:hiddenLine>
             </a:ext>
             <a:ext uri="{FAA26D3D-D897-4be2-8F04-BA451C77F1D7}">
-              <ma14:placeholderFlag xmlns:ma14="http://schemas.microsoft.com/office/mac/drawingml/2011/main" xmlns="" val="1"/>
+              <ma14:placeholderFlag xmlns="" xmlns:ma14="http://schemas.microsoft.com/office/mac/drawingml/2011/main" val="1"/>
             </a:ext>
           </a:extLst>
         </p:spPr>
@@ -22051,7 +22194,7 @@
           </a:ln>
           <a:extLst>
             <a:ext uri="{91240B29-F687-4f45-9708-019B960494DF}">
-              <a14:hiddenLine xmlns:a14="http://schemas.microsoft.com/office/drawing/2010/main" xmlns="" w="9525">
+              <a14:hiddenLine xmlns="" xmlns:a14="http://schemas.microsoft.com/office/drawing/2010/main" w="9525">
                 <a:solidFill>
                   <a:srgbClr val="000000"/>
                 </a:solidFill>
@@ -22282,7 +22425,7 @@
           </a:ln>
           <a:extLst>
             <a:ext uri="{91240B29-F687-4f45-9708-019B960494DF}">
-              <a14:hiddenLine xmlns:a14="http://schemas.microsoft.com/office/drawing/2010/main" xmlns="" w="9525">
+              <a14:hiddenLine xmlns="" xmlns:a14="http://schemas.microsoft.com/office/drawing/2010/main" w="9525">
                 <a:solidFill>
                   <a:srgbClr val="000000"/>
                 </a:solidFill>
@@ -22464,14 +22607,14 @@
           </a:ln>
           <a:extLst>
             <a:ext uri="{909E8E84-426E-40dd-AFC4-6F175D3DCCD1}">
-              <a14:hiddenFill xmlns:a14="http://schemas.microsoft.com/office/drawing/2010/main" xmlns="">
+              <a14:hiddenFill xmlns="" xmlns:a14="http://schemas.microsoft.com/office/drawing/2010/main">
                 <a:solidFill>
                   <a:srgbClr val="FFFFFF"/>
                 </a:solidFill>
               </a14:hiddenFill>
             </a:ext>
             <a:ext uri="{91240B29-F687-4f45-9708-019B960494DF}">
-              <a14:hiddenLine xmlns:a14="http://schemas.microsoft.com/office/drawing/2010/main" xmlns="" w="9525">
+              <a14:hiddenLine xmlns="" xmlns:a14="http://schemas.microsoft.com/office/drawing/2010/main" w="9525">
                 <a:solidFill>
                   <a:srgbClr val="000000"/>
                 </a:solidFill>
@@ -22853,14 +22996,14 @@
           </a:ln>
           <a:extLst>
             <a:ext uri="{909E8E84-426E-40dd-AFC4-6F175D3DCCD1}">
-              <a14:hiddenFill xmlns:a14="http://schemas.microsoft.com/office/drawing/2010/main" xmlns="">
+              <a14:hiddenFill xmlns="" xmlns:a14="http://schemas.microsoft.com/office/drawing/2010/main">
                 <a:solidFill>
                   <a:srgbClr val="FFFFFF"/>
                 </a:solidFill>
               </a14:hiddenFill>
             </a:ext>
             <a:ext uri="{91240B29-F687-4f45-9708-019B960494DF}">
-              <a14:hiddenLine xmlns:a14="http://schemas.microsoft.com/office/drawing/2010/main" xmlns="" w="9525">
+              <a14:hiddenLine xmlns="" xmlns:a14="http://schemas.microsoft.com/office/drawing/2010/main" w="9525">
                 <a:solidFill>
                   <a:srgbClr val="000000"/>
                 </a:solidFill>
@@ -22870,7 +23013,7 @@
               </a14:hiddenLine>
             </a:ext>
             <a:ext uri="{FAA26D3D-D897-4be2-8F04-BA451C77F1D7}">
-              <ma14:placeholderFlag xmlns:ma14="http://schemas.microsoft.com/office/mac/drawingml/2011/main" xmlns="" val="1"/>
+              <ma14:placeholderFlag xmlns="" xmlns:ma14="http://schemas.microsoft.com/office/mac/drawingml/2011/main" val="1"/>
             </a:ext>
           </a:extLst>
         </p:spPr>
@@ -23237,7 +23380,7 @@
             </a:ln>
             <a:extLst>
               <a:ext uri="{91240B29-F687-4f45-9708-019B960494DF}">
-                <a14:hiddenLine xmlns:a14="http://schemas.microsoft.com/office/drawing/2010/main" xmlns="" w="9525">
+                <a14:hiddenLine xmlns="" xmlns:a14="http://schemas.microsoft.com/office/drawing/2010/main" w="9525">
                   <a:solidFill>
                     <a:srgbClr val="000000"/>
                   </a:solidFill>
@@ -23282,14 +23425,14 @@
             </a:ln>
             <a:extLst>
               <a:ext uri="{909E8E84-426E-40dd-AFC4-6F175D3DCCD1}">
-                <a14:hiddenFill xmlns:a14="http://schemas.microsoft.com/office/drawing/2010/main" xmlns="">
+                <a14:hiddenFill xmlns="" xmlns:a14="http://schemas.microsoft.com/office/drawing/2010/main">
                   <a:solidFill>
                     <a:srgbClr val="FFFFFF"/>
                   </a:solidFill>
                 </a14:hiddenFill>
               </a:ext>
               <a:ext uri="{91240B29-F687-4f45-9708-019B960494DF}">
-                <a14:hiddenLine xmlns:a14="http://schemas.microsoft.com/office/drawing/2010/main" xmlns="" w="9525">
+                <a14:hiddenLine xmlns="" xmlns:a14="http://schemas.microsoft.com/office/drawing/2010/main" w="9525">
                   <a:solidFill>
                     <a:srgbClr val="000000"/>
                   </a:solidFill>
@@ -23507,7 +23650,7 @@
             </a:ln>
             <a:extLst>
               <a:ext uri="{91240B29-F687-4f45-9708-019B960494DF}">
-                <a14:hiddenLine xmlns:a14="http://schemas.microsoft.com/office/drawing/2010/main" xmlns="" w="9525">
+                <a14:hiddenLine xmlns="" xmlns:a14="http://schemas.microsoft.com/office/drawing/2010/main" w="9525">
                   <a:solidFill>
                     <a:srgbClr val="000000"/>
                   </a:solidFill>
@@ -23552,14 +23695,14 @@
             </a:ln>
             <a:extLst>
               <a:ext uri="{909E8E84-426E-40dd-AFC4-6F175D3DCCD1}">
-                <a14:hiddenFill xmlns:a14="http://schemas.microsoft.com/office/drawing/2010/main" xmlns="">
+                <a14:hiddenFill xmlns="" xmlns:a14="http://schemas.microsoft.com/office/drawing/2010/main">
                   <a:solidFill>
                     <a:srgbClr val="FFFFFF"/>
                   </a:solidFill>
                 </a14:hiddenFill>
               </a:ext>
               <a:ext uri="{91240B29-F687-4f45-9708-019B960494DF}">
-                <a14:hiddenLine xmlns:a14="http://schemas.microsoft.com/office/drawing/2010/main" xmlns="" w="9525">
+                <a14:hiddenLine xmlns="" xmlns:a14="http://schemas.microsoft.com/office/drawing/2010/main" w="9525">
                   <a:solidFill>
                     <a:srgbClr val="000000"/>
                   </a:solidFill>
@@ -23657,14 +23800,14 @@
             </a:ln>
             <a:extLst>
               <a:ext uri="{909E8E84-426E-40dd-AFC4-6F175D3DCCD1}">
-                <a14:hiddenFill xmlns:a14="http://schemas.microsoft.com/office/drawing/2010/main" xmlns="">
+                <a14:hiddenFill xmlns="" xmlns:a14="http://schemas.microsoft.com/office/drawing/2010/main">
                   <a:solidFill>
                     <a:srgbClr val="FFFFFF"/>
                   </a:solidFill>
                 </a14:hiddenFill>
               </a:ext>
               <a:ext uri="{91240B29-F687-4f45-9708-019B960494DF}">
-                <a14:hiddenLine xmlns:a14="http://schemas.microsoft.com/office/drawing/2010/main" xmlns="" w="9525">
+                <a14:hiddenLine xmlns="" xmlns:a14="http://schemas.microsoft.com/office/drawing/2010/main" w="9525">
                   <a:solidFill>
                     <a:srgbClr val="000000"/>
                   </a:solidFill>
@@ -23846,7 +23989,7 @@
             </a:ln>
             <a:extLst>
               <a:ext uri="{909E8E84-426E-40dd-AFC4-6F175D3DCCD1}">
-                <a14:hiddenFill xmlns:a14="http://schemas.microsoft.com/office/drawing/2010/main" xmlns="">
+                <a14:hiddenFill xmlns="" xmlns:a14="http://schemas.microsoft.com/office/drawing/2010/main">
                   <a:noFill/>
                 </a14:hiddenFill>
               </a:ext>
@@ -23876,14 +24019,14 @@
           </a:ln>
           <a:extLst>
             <a:ext uri="{909E8E84-426E-40dd-AFC4-6F175D3DCCD1}">
-              <a14:hiddenFill xmlns:a14="http://schemas.microsoft.com/office/drawing/2010/main" xmlns="">
+              <a14:hiddenFill xmlns="" xmlns:a14="http://schemas.microsoft.com/office/drawing/2010/main">
                 <a:solidFill>
                   <a:srgbClr val="FFFFFF"/>
                 </a:solidFill>
               </a14:hiddenFill>
             </a:ext>
             <a:ext uri="{91240B29-F687-4f45-9708-019B960494DF}">
-              <a14:hiddenLine xmlns:a14="http://schemas.microsoft.com/office/drawing/2010/main" xmlns="" w="9525">
+              <a14:hiddenLine xmlns="" xmlns:a14="http://schemas.microsoft.com/office/drawing/2010/main" w="9525">
                 <a:solidFill>
                   <a:srgbClr val="000000"/>
                 </a:solidFill>
@@ -24051,7 +24194,7 @@
           </a:ln>
           <a:extLst>
             <a:ext uri="{909E8E84-426E-40dd-AFC4-6F175D3DCCD1}">
-              <a14:hiddenFill xmlns:a14="http://schemas.microsoft.com/office/drawing/2010/main" xmlns="">
+              <a14:hiddenFill xmlns="" xmlns:a14="http://schemas.microsoft.com/office/drawing/2010/main">
                 <a:noFill/>
               </a14:hiddenFill>
             </a:ext>
@@ -24113,7 +24256,7 @@
           <a:effectLst/>
           <a:extLst>
             <a:ext uri="{FAA26D3D-D897-4be2-8F04-BA451C77F1D7}">
-              <ma14:placeholderFlag xmlns:ma14="http://schemas.microsoft.com/office/mac/drawingml/2011/main" xmlns="" val="1"/>
+              <ma14:placeholderFlag xmlns="" xmlns:ma14="http://schemas.microsoft.com/office/mac/drawingml/2011/main" val="1"/>
             </a:ext>
           </a:extLst>
         </p:spPr>
@@ -24306,14 +24449,14 @@
           </a:ln>
           <a:extLst>
             <a:ext uri="{909E8E84-426E-40dd-AFC4-6F175D3DCCD1}">
-              <a14:hiddenFill xmlns:a14="http://schemas.microsoft.com/office/drawing/2010/main" xmlns="">
+              <a14:hiddenFill xmlns="" xmlns:a14="http://schemas.microsoft.com/office/drawing/2010/main">
                 <a:solidFill>
                   <a:srgbClr val="FFFFFF"/>
                 </a:solidFill>
               </a14:hiddenFill>
             </a:ext>
             <a:ext uri="{91240B29-F687-4f45-9708-019B960494DF}">
-              <a14:hiddenLine xmlns:a14="http://schemas.microsoft.com/office/drawing/2010/main" xmlns="" w="9525">
+              <a14:hiddenLine xmlns="" xmlns:a14="http://schemas.microsoft.com/office/drawing/2010/main" w="9525">
                 <a:solidFill>
                   <a:srgbClr val="000000"/>
                 </a:solidFill>
@@ -24323,7 +24466,7 @@
               </a14:hiddenLine>
             </a:ext>
             <a:ext uri="{FAA26D3D-D897-4be2-8F04-BA451C77F1D7}">
-              <ma14:placeholderFlag xmlns:ma14="http://schemas.microsoft.com/office/mac/drawingml/2011/main" xmlns="" val="1"/>
+              <ma14:placeholderFlag xmlns="" xmlns:ma14="http://schemas.microsoft.com/office/mac/drawingml/2011/main" val="1"/>
             </a:ext>
           </a:extLst>
         </p:spPr>
@@ -24845,14 +24988,14 @@
           </a:ln>
           <a:extLst>
             <a:ext uri="{909E8E84-426E-40dd-AFC4-6F175D3DCCD1}">
-              <a14:hiddenFill xmlns:a14="http://schemas.microsoft.com/office/drawing/2010/main" xmlns="">
+              <a14:hiddenFill xmlns="" xmlns:a14="http://schemas.microsoft.com/office/drawing/2010/main">
                 <a:solidFill>
                   <a:srgbClr val="FFFFFF"/>
                 </a:solidFill>
               </a14:hiddenFill>
             </a:ext>
             <a:ext uri="{91240B29-F687-4f45-9708-019B960494DF}">
-              <a14:hiddenLine xmlns:a14="http://schemas.microsoft.com/office/drawing/2010/main" xmlns="" w="9525">
+              <a14:hiddenLine xmlns="" xmlns:a14="http://schemas.microsoft.com/office/drawing/2010/main" w="9525">
                 <a:solidFill>
                   <a:srgbClr val="000000"/>
                 </a:solidFill>
@@ -24941,14 +25084,14 @@
           </a:ln>
           <a:extLst>
             <a:ext uri="{909E8E84-426E-40dd-AFC4-6F175D3DCCD1}">
-              <a14:hiddenFill xmlns:a14="http://schemas.microsoft.com/office/drawing/2010/main" xmlns="">
+              <a14:hiddenFill xmlns="" xmlns:a14="http://schemas.microsoft.com/office/drawing/2010/main">
                 <a:solidFill>
                   <a:srgbClr val="FFFFFF"/>
                 </a:solidFill>
               </a14:hiddenFill>
             </a:ext>
             <a:ext uri="{91240B29-F687-4f45-9708-019B960494DF}">
-              <a14:hiddenLine xmlns:a14="http://schemas.microsoft.com/office/drawing/2010/main" xmlns="" w="9525">
+              <a14:hiddenLine xmlns="" xmlns:a14="http://schemas.microsoft.com/office/drawing/2010/main" w="9525">
                 <a:solidFill>
                   <a:srgbClr val="000000"/>
                 </a:solidFill>
@@ -24958,7 +25101,7 @@
               </a14:hiddenLine>
             </a:ext>
             <a:ext uri="{FAA26D3D-D897-4be2-8F04-BA451C77F1D7}">
-              <ma14:placeholderFlag xmlns:ma14="http://schemas.microsoft.com/office/mac/drawingml/2011/main" xmlns="" val="1"/>
+              <ma14:placeholderFlag xmlns="" xmlns:ma14="http://schemas.microsoft.com/office/mac/drawingml/2011/main" val="1"/>
             </a:ext>
           </a:extLst>
         </p:spPr>
@@ -25751,7 +25894,7 @@
             </a:ln>
             <a:extLst>
               <a:ext uri="{91240B29-F687-4f45-9708-019B960494DF}">
-                <a14:hiddenLine xmlns:a14="http://schemas.microsoft.com/office/drawing/2010/main" xmlns="" w="9525">
+                <a14:hiddenLine xmlns="" xmlns:a14="http://schemas.microsoft.com/office/drawing/2010/main" w="9525">
                   <a:solidFill>
                     <a:srgbClr val="000000"/>
                   </a:solidFill>
@@ -25796,14 +25939,14 @@
             </a:ln>
             <a:extLst>
               <a:ext uri="{909E8E84-426E-40dd-AFC4-6F175D3DCCD1}">
-                <a14:hiddenFill xmlns:a14="http://schemas.microsoft.com/office/drawing/2010/main" xmlns="">
+                <a14:hiddenFill xmlns="" xmlns:a14="http://schemas.microsoft.com/office/drawing/2010/main">
                   <a:solidFill>
                     <a:srgbClr val="FFFFFF"/>
                   </a:solidFill>
                 </a14:hiddenFill>
               </a:ext>
               <a:ext uri="{91240B29-F687-4f45-9708-019B960494DF}">
-                <a14:hiddenLine xmlns:a14="http://schemas.microsoft.com/office/drawing/2010/main" xmlns="" w="9525">
+                <a14:hiddenLine xmlns="" xmlns:a14="http://schemas.microsoft.com/office/drawing/2010/main" w="9525">
                   <a:solidFill>
                     <a:srgbClr val="000000"/>
                   </a:solidFill>
@@ -26169,14 +26312,14 @@
           </a:ln>
           <a:extLst>
             <a:ext uri="{909E8E84-426E-40dd-AFC4-6F175D3DCCD1}">
-              <a14:hiddenFill xmlns:a14="http://schemas.microsoft.com/office/drawing/2010/main" xmlns="">
+              <a14:hiddenFill xmlns="" xmlns:a14="http://schemas.microsoft.com/office/drawing/2010/main">
                 <a:solidFill>
                   <a:srgbClr val="FFFFFF"/>
                 </a:solidFill>
               </a14:hiddenFill>
             </a:ext>
             <a:ext uri="{91240B29-F687-4f45-9708-019B960494DF}">
-              <a14:hiddenLine xmlns:a14="http://schemas.microsoft.com/office/drawing/2010/main" xmlns="" w="9525">
+              <a14:hiddenLine xmlns="" xmlns:a14="http://schemas.microsoft.com/office/drawing/2010/main" w="9525">
                 <a:solidFill>
                   <a:srgbClr val="000000"/>
                 </a:solidFill>
@@ -26223,14 +26366,14 @@
           </a:ln>
           <a:extLst>
             <a:ext uri="{909E8E84-426E-40dd-AFC4-6F175D3DCCD1}">
-              <a14:hiddenFill xmlns:a14="http://schemas.microsoft.com/office/drawing/2010/main" xmlns="">
+              <a14:hiddenFill xmlns="" xmlns:a14="http://schemas.microsoft.com/office/drawing/2010/main">
                 <a:solidFill>
                   <a:srgbClr val="FFFFFF"/>
                 </a:solidFill>
               </a14:hiddenFill>
             </a:ext>
             <a:ext uri="{91240B29-F687-4f45-9708-019B960494DF}">
-              <a14:hiddenLine xmlns:a14="http://schemas.microsoft.com/office/drawing/2010/main" xmlns="" w="9525">
+              <a14:hiddenLine xmlns="" xmlns:a14="http://schemas.microsoft.com/office/drawing/2010/main" w="9525">
                 <a:solidFill>
                   <a:srgbClr val="000000"/>
                 </a:solidFill>
@@ -26493,7 +26636,7 @@
             </a:ln>
             <a:extLst>
               <a:ext uri="{91240B29-F687-4f45-9708-019B960494DF}">
-                <a14:hiddenLine xmlns:a14="http://schemas.microsoft.com/office/drawing/2010/main" xmlns="" w="9525">
+                <a14:hiddenLine xmlns="" xmlns:a14="http://schemas.microsoft.com/office/drawing/2010/main" w="9525">
                   <a:solidFill>
                     <a:srgbClr val="000000"/>
                   </a:solidFill>
@@ -26538,14 +26681,14 @@
             </a:ln>
             <a:extLst>
               <a:ext uri="{909E8E84-426E-40dd-AFC4-6F175D3DCCD1}">
-                <a14:hiddenFill xmlns:a14="http://schemas.microsoft.com/office/drawing/2010/main" xmlns="">
+                <a14:hiddenFill xmlns="" xmlns:a14="http://schemas.microsoft.com/office/drawing/2010/main">
                   <a:solidFill>
                     <a:srgbClr val="FFFFFF"/>
                   </a:solidFill>
                 </a14:hiddenFill>
               </a:ext>
               <a:ext uri="{91240B29-F687-4f45-9708-019B960494DF}">
-                <a14:hiddenLine xmlns:a14="http://schemas.microsoft.com/office/drawing/2010/main" xmlns="" w="9525">
+                <a14:hiddenLine xmlns="" xmlns:a14="http://schemas.microsoft.com/office/drawing/2010/main" w="9525">
                   <a:solidFill>
                     <a:srgbClr val="000000"/>
                   </a:solidFill>
@@ -26627,7 +26770,7 @@
           <a:effectLst/>
           <a:extLst>
             <a:ext uri="{FAA26D3D-D897-4be2-8F04-BA451C77F1D7}">
-              <ma14:placeholderFlag xmlns:ma14="http://schemas.microsoft.com/office/mac/drawingml/2011/main" xmlns="" val="1"/>
+              <ma14:placeholderFlag xmlns="" xmlns:ma14="http://schemas.microsoft.com/office/mac/drawingml/2011/main" val="1"/>
             </a:ext>
           </a:extLst>
         </p:spPr>
@@ -26820,14 +26963,14 @@
           </a:ln>
           <a:extLst>
             <a:ext uri="{909E8E84-426E-40dd-AFC4-6F175D3DCCD1}">
-              <a14:hiddenFill xmlns:a14="http://schemas.microsoft.com/office/drawing/2010/main" xmlns="">
+              <a14:hiddenFill xmlns="" xmlns:a14="http://schemas.microsoft.com/office/drawing/2010/main">
                 <a:solidFill>
                   <a:srgbClr val="FFFFFF"/>
                 </a:solidFill>
               </a14:hiddenFill>
             </a:ext>
             <a:ext uri="{91240B29-F687-4f45-9708-019B960494DF}">
-              <a14:hiddenLine xmlns:a14="http://schemas.microsoft.com/office/drawing/2010/main" xmlns="" w="9525">
+              <a14:hiddenLine xmlns="" xmlns:a14="http://schemas.microsoft.com/office/drawing/2010/main" w="9525">
                 <a:solidFill>
                   <a:srgbClr val="000000"/>
                 </a:solidFill>
@@ -26837,7 +26980,7 @@
               </a14:hiddenLine>
             </a:ext>
             <a:ext uri="{FAA26D3D-D897-4be2-8F04-BA451C77F1D7}">
-              <ma14:placeholderFlag xmlns:ma14="http://schemas.microsoft.com/office/mac/drawingml/2011/main" xmlns="" val="1"/>
+              <ma14:placeholderFlag xmlns="" xmlns:ma14="http://schemas.microsoft.com/office/mac/drawingml/2011/main" val="1"/>
             </a:ext>
           </a:extLst>
         </p:spPr>
@@ -27207,7 +27350,7 @@
             </a:ln>
             <a:extLst>
               <a:ext uri="{91240B29-F687-4f45-9708-019B960494DF}">
-                <a14:hiddenLine xmlns:a14="http://schemas.microsoft.com/office/drawing/2010/main" xmlns="" w="9525">
+                <a14:hiddenLine xmlns="" xmlns:a14="http://schemas.microsoft.com/office/drawing/2010/main" w="9525">
                   <a:solidFill>
                     <a:srgbClr val="000000"/>
                   </a:solidFill>
@@ -27252,14 +27395,14 @@
             </a:ln>
             <a:extLst>
               <a:ext uri="{909E8E84-426E-40dd-AFC4-6F175D3DCCD1}">
-                <a14:hiddenFill xmlns:a14="http://schemas.microsoft.com/office/drawing/2010/main" xmlns="">
+                <a14:hiddenFill xmlns="" xmlns:a14="http://schemas.microsoft.com/office/drawing/2010/main">
                   <a:solidFill>
                     <a:srgbClr val="FFFFFF"/>
                   </a:solidFill>
                 </a14:hiddenFill>
               </a:ext>
               <a:ext uri="{91240B29-F687-4f45-9708-019B960494DF}">
-                <a14:hiddenLine xmlns:a14="http://schemas.microsoft.com/office/drawing/2010/main" xmlns="" w="9525">
+                <a14:hiddenLine xmlns="" xmlns:a14="http://schemas.microsoft.com/office/drawing/2010/main" w="9525">
                   <a:solidFill>
                     <a:srgbClr val="000000"/>
                   </a:solidFill>
@@ -27359,7 +27502,7 @@
             </a:ln>
             <a:extLst>
               <a:ext uri="{91240B29-F687-4f45-9708-019B960494DF}">
-                <a14:hiddenLine xmlns:a14="http://schemas.microsoft.com/office/drawing/2010/main" xmlns="" w="9525">
+                <a14:hiddenLine xmlns="" xmlns:a14="http://schemas.microsoft.com/office/drawing/2010/main" w="9525">
                   <a:solidFill>
                     <a:srgbClr val="000000"/>
                   </a:solidFill>
@@ -27404,14 +27547,14 @@
             </a:ln>
             <a:extLst>
               <a:ext uri="{909E8E84-426E-40dd-AFC4-6F175D3DCCD1}">
-                <a14:hiddenFill xmlns:a14="http://schemas.microsoft.com/office/drawing/2010/main" xmlns="">
+                <a14:hiddenFill xmlns="" xmlns:a14="http://schemas.microsoft.com/office/drawing/2010/main">
                   <a:solidFill>
                     <a:srgbClr val="FFFFFF"/>
                   </a:solidFill>
                 </a14:hiddenFill>
               </a:ext>
               <a:ext uri="{91240B29-F687-4f45-9708-019B960494DF}">
-                <a14:hiddenLine xmlns:a14="http://schemas.microsoft.com/office/drawing/2010/main" xmlns="" w="9525">
+                <a14:hiddenLine xmlns="" xmlns:a14="http://schemas.microsoft.com/office/drawing/2010/main" w="9525">
                   <a:solidFill>
                     <a:srgbClr val="000000"/>
                   </a:solidFill>
@@ -27527,7 +27670,7 @@
             </a:ln>
             <a:extLst>
               <a:ext uri="{91240B29-F687-4f45-9708-019B960494DF}">
-                <a14:hiddenLine xmlns:a14="http://schemas.microsoft.com/office/drawing/2010/main" xmlns="" w="9525">
+                <a14:hiddenLine xmlns="" xmlns:a14="http://schemas.microsoft.com/office/drawing/2010/main" w="9525">
                   <a:solidFill>
                     <a:srgbClr val="000000"/>
                   </a:solidFill>
@@ -27572,14 +27715,14 @@
             </a:ln>
             <a:extLst>
               <a:ext uri="{909E8E84-426E-40dd-AFC4-6F175D3DCCD1}">
-                <a14:hiddenFill xmlns:a14="http://schemas.microsoft.com/office/drawing/2010/main" xmlns="">
+                <a14:hiddenFill xmlns="" xmlns:a14="http://schemas.microsoft.com/office/drawing/2010/main">
                   <a:solidFill>
                     <a:srgbClr val="FFFFFF"/>
                   </a:solidFill>
                 </a14:hiddenFill>
               </a:ext>
               <a:ext uri="{91240B29-F687-4f45-9708-019B960494DF}">
-                <a14:hiddenLine xmlns:a14="http://schemas.microsoft.com/office/drawing/2010/main" xmlns="" w="9525">
+                <a14:hiddenLine xmlns="" xmlns:a14="http://schemas.microsoft.com/office/drawing/2010/main" w="9525">
                   <a:solidFill>
                     <a:srgbClr val="000000"/>
                   </a:solidFill>
@@ -27692,7 +27835,7 @@
             </a:ln>
             <a:extLst>
               <a:ext uri="{91240B29-F687-4f45-9708-019B960494DF}">
-                <a14:hiddenLine xmlns:a14="http://schemas.microsoft.com/office/drawing/2010/main" xmlns="" w="9525">
+                <a14:hiddenLine xmlns="" xmlns:a14="http://schemas.microsoft.com/office/drawing/2010/main" w="9525">
                   <a:solidFill>
                     <a:srgbClr val="000000"/>
                   </a:solidFill>
@@ -27737,14 +27880,14 @@
             </a:ln>
             <a:extLst>
               <a:ext uri="{909E8E84-426E-40dd-AFC4-6F175D3DCCD1}">
-                <a14:hiddenFill xmlns:a14="http://schemas.microsoft.com/office/drawing/2010/main" xmlns="">
+                <a14:hiddenFill xmlns="" xmlns:a14="http://schemas.microsoft.com/office/drawing/2010/main">
                   <a:solidFill>
                     <a:srgbClr val="FFFFFF"/>
                   </a:solidFill>
                 </a14:hiddenFill>
               </a:ext>
               <a:ext uri="{91240B29-F687-4f45-9708-019B960494DF}">
-                <a14:hiddenLine xmlns:a14="http://schemas.microsoft.com/office/drawing/2010/main" xmlns="" w="9525">
+                <a14:hiddenLine xmlns="" xmlns:a14="http://schemas.microsoft.com/office/drawing/2010/main" w="9525">
                   <a:solidFill>
                     <a:srgbClr val="000000"/>
                   </a:solidFill>
@@ -27844,7 +27987,7 @@
           </a:ln>
           <a:extLst>
             <a:ext uri="{909E8E84-426E-40dd-AFC4-6F175D3DCCD1}">
-              <a14:hiddenFill xmlns:a14="http://schemas.microsoft.com/office/drawing/2010/main" xmlns="">
+              <a14:hiddenFill xmlns="" xmlns:a14="http://schemas.microsoft.com/office/drawing/2010/main">
                 <a:noFill/>
               </a14:hiddenFill>
             </a:ext>
@@ -27891,7 +28034,7 @@
             </a:ln>
             <a:extLst>
               <a:ext uri="{91240B29-F687-4f45-9708-019B960494DF}">
-                <a14:hiddenLine xmlns:a14="http://schemas.microsoft.com/office/drawing/2010/main" xmlns="" w="9525">
+                <a14:hiddenLine xmlns="" xmlns:a14="http://schemas.microsoft.com/office/drawing/2010/main" w="9525">
                   <a:solidFill>
                     <a:srgbClr val="000000"/>
                   </a:solidFill>
@@ -27936,14 +28079,14 @@
             </a:ln>
             <a:extLst>
               <a:ext uri="{909E8E84-426E-40dd-AFC4-6F175D3DCCD1}">
-                <a14:hiddenFill xmlns:a14="http://schemas.microsoft.com/office/drawing/2010/main" xmlns="">
+                <a14:hiddenFill xmlns="" xmlns:a14="http://schemas.microsoft.com/office/drawing/2010/main">
                   <a:solidFill>
                     <a:srgbClr val="FFFFFF"/>
                   </a:solidFill>
                 </a14:hiddenFill>
               </a:ext>
               <a:ext uri="{91240B29-F687-4f45-9708-019B960494DF}">
-                <a14:hiddenLine xmlns:a14="http://schemas.microsoft.com/office/drawing/2010/main" xmlns="" w="9525">
+                <a14:hiddenLine xmlns="" xmlns:a14="http://schemas.microsoft.com/office/drawing/2010/main" w="9525">
                   <a:solidFill>
                     <a:srgbClr val="000000"/>
                   </a:solidFill>
@@ -28043,7 +28186,7 @@
             </a:ln>
             <a:extLst>
               <a:ext uri="{91240B29-F687-4f45-9708-019B960494DF}">
-                <a14:hiddenLine xmlns:a14="http://schemas.microsoft.com/office/drawing/2010/main" xmlns="" w="9525">
+                <a14:hiddenLine xmlns="" xmlns:a14="http://schemas.microsoft.com/office/drawing/2010/main" w="9525">
                   <a:solidFill>
                     <a:srgbClr val="000000"/>
                   </a:solidFill>
@@ -28088,14 +28231,14 @@
             </a:ln>
             <a:extLst>
               <a:ext uri="{909E8E84-426E-40dd-AFC4-6F175D3DCCD1}">
-                <a14:hiddenFill xmlns:a14="http://schemas.microsoft.com/office/drawing/2010/main" xmlns="">
+                <a14:hiddenFill xmlns="" xmlns:a14="http://schemas.microsoft.com/office/drawing/2010/main">
                   <a:solidFill>
                     <a:srgbClr val="FFFFFF"/>
                   </a:solidFill>
                 </a14:hiddenFill>
               </a:ext>
               <a:ext uri="{91240B29-F687-4f45-9708-019B960494DF}">
-                <a14:hiddenLine xmlns:a14="http://schemas.microsoft.com/office/drawing/2010/main" xmlns="" w="9525">
+                <a14:hiddenLine xmlns="" xmlns:a14="http://schemas.microsoft.com/office/drawing/2010/main" w="9525">
                   <a:solidFill>
                     <a:srgbClr val="000000"/>
                   </a:solidFill>
@@ -28195,7 +28338,7 @@
             </a:ln>
             <a:extLst>
               <a:ext uri="{91240B29-F687-4f45-9708-019B960494DF}">
-                <a14:hiddenLine xmlns:a14="http://schemas.microsoft.com/office/drawing/2010/main" xmlns="" w="9525">
+                <a14:hiddenLine xmlns="" xmlns:a14="http://schemas.microsoft.com/office/drawing/2010/main" w="9525">
                   <a:solidFill>
                     <a:srgbClr val="000000"/>
                   </a:solidFill>
@@ -28240,14 +28383,14 @@
             </a:ln>
             <a:extLst>
               <a:ext uri="{909E8E84-426E-40dd-AFC4-6F175D3DCCD1}">
-                <a14:hiddenFill xmlns:a14="http://schemas.microsoft.com/office/drawing/2010/main" xmlns="">
+                <a14:hiddenFill xmlns="" xmlns:a14="http://schemas.microsoft.com/office/drawing/2010/main">
                   <a:solidFill>
                     <a:srgbClr val="FFFFFF"/>
                   </a:solidFill>
                 </a14:hiddenFill>
               </a:ext>
               <a:ext uri="{91240B29-F687-4f45-9708-019B960494DF}">
-                <a14:hiddenLine xmlns:a14="http://schemas.microsoft.com/office/drawing/2010/main" xmlns="" w="9525">
+                <a14:hiddenLine xmlns="" xmlns:a14="http://schemas.microsoft.com/office/drawing/2010/main" w="9525">
                   <a:solidFill>
                     <a:srgbClr val="000000"/>
                   </a:solidFill>
@@ -28347,7 +28490,7 @@
             </a:ln>
             <a:extLst>
               <a:ext uri="{91240B29-F687-4f45-9708-019B960494DF}">
-                <a14:hiddenLine xmlns:a14="http://schemas.microsoft.com/office/drawing/2010/main" xmlns="" w="9525">
+                <a14:hiddenLine xmlns="" xmlns:a14="http://schemas.microsoft.com/office/drawing/2010/main" w="9525">
                   <a:solidFill>
                     <a:srgbClr val="000000"/>
                   </a:solidFill>
@@ -28392,14 +28535,14 @@
             </a:ln>
             <a:extLst>
               <a:ext uri="{909E8E84-426E-40dd-AFC4-6F175D3DCCD1}">
-                <a14:hiddenFill xmlns:a14="http://schemas.microsoft.com/office/drawing/2010/main" xmlns="">
+                <a14:hiddenFill xmlns="" xmlns:a14="http://schemas.microsoft.com/office/drawing/2010/main">
                   <a:solidFill>
                     <a:srgbClr val="FFFFFF"/>
                   </a:solidFill>
                 </a14:hiddenFill>
               </a:ext>
               <a:ext uri="{91240B29-F687-4f45-9708-019B960494DF}">
-                <a14:hiddenLine xmlns:a14="http://schemas.microsoft.com/office/drawing/2010/main" xmlns="" w="9525">
+                <a14:hiddenLine xmlns="" xmlns:a14="http://schemas.microsoft.com/office/drawing/2010/main" w="9525">
                   <a:solidFill>
                     <a:srgbClr val="000000"/>
                   </a:solidFill>
@@ -28520,7 +28663,7 @@
             </a:ln>
             <a:extLst>
               <a:ext uri="{91240B29-F687-4f45-9708-019B960494DF}">
-                <a14:hiddenLine xmlns:a14="http://schemas.microsoft.com/office/drawing/2010/main" xmlns="" w="9525">
+                <a14:hiddenLine xmlns="" xmlns:a14="http://schemas.microsoft.com/office/drawing/2010/main" w="9525">
                   <a:solidFill>
                     <a:srgbClr val="000000"/>
                   </a:solidFill>
@@ -28565,14 +28708,14 @@
             </a:ln>
             <a:extLst>
               <a:ext uri="{909E8E84-426E-40dd-AFC4-6F175D3DCCD1}">
-                <a14:hiddenFill xmlns:a14="http://schemas.microsoft.com/office/drawing/2010/main" xmlns="">
+                <a14:hiddenFill xmlns="" xmlns:a14="http://schemas.microsoft.com/office/drawing/2010/main">
                   <a:solidFill>
                     <a:srgbClr val="FFFFFF"/>
                   </a:solidFill>
                 </a14:hiddenFill>
               </a:ext>
               <a:ext uri="{91240B29-F687-4f45-9708-019B960494DF}">
-                <a14:hiddenLine xmlns:a14="http://schemas.microsoft.com/office/drawing/2010/main" xmlns="" w="9525">
+                <a14:hiddenLine xmlns="" xmlns:a14="http://schemas.microsoft.com/office/drawing/2010/main" w="9525">
                   <a:solidFill>
                     <a:srgbClr val="000000"/>
                   </a:solidFill>
@@ -28672,7 +28815,7 @@
           </a:ln>
           <a:extLst>
             <a:ext uri="{909E8E84-426E-40dd-AFC4-6F175D3DCCD1}">
-              <a14:hiddenFill xmlns:a14="http://schemas.microsoft.com/office/drawing/2010/main" xmlns="">
+              <a14:hiddenFill xmlns="" xmlns:a14="http://schemas.microsoft.com/office/drawing/2010/main">
                 <a:noFill/>
               </a14:hiddenFill>
             </a:ext>
@@ -28719,7 +28862,7 @@
             </a:ln>
             <a:extLst>
               <a:ext uri="{91240B29-F687-4f45-9708-019B960494DF}">
-                <a14:hiddenLine xmlns:a14="http://schemas.microsoft.com/office/drawing/2010/main" xmlns="" w="9525">
+                <a14:hiddenLine xmlns="" xmlns:a14="http://schemas.microsoft.com/office/drawing/2010/main" w="9525">
                   <a:solidFill>
                     <a:srgbClr val="000000"/>
                   </a:solidFill>
@@ -28764,14 +28907,14 @@
             </a:ln>
             <a:extLst>
               <a:ext uri="{909E8E84-426E-40dd-AFC4-6F175D3DCCD1}">
-                <a14:hiddenFill xmlns:a14="http://schemas.microsoft.com/office/drawing/2010/main" xmlns="">
+                <a14:hiddenFill xmlns="" xmlns:a14="http://schemas.microsoft.com/office/drawing/2010/main">
                   <a:solidFill>
                     <a:srgbClr val="FFFFFF"/>
                   </a:solidFill>
                 </a14:hiddenFill>
               </a:ext>
               <a:ext uri="{91240B29-F687-4f45-9708-019B960494DF}">
-                <a14:hiddenLine xmlns:a14="http://schemas.microsoft.com/office/drawing/2010/main" xmlns="" w="9525">
+                <a14:hiddenLine xmlns="" xmlns:a14="http://schemas.microsoft.com/office/drawing/2010/main" w="9525">
                   <a:solidFill>
                     <a:srgbClr val="000000"/>
                   </a:solidFill>

</xml_diff>